<commit_message>
Fix mermaid.js DAGs: view-distance and mobile-view-distance
</commit_message>
<xml_diff>
--- a/images/images.pptx
+++ b/images/images.pptx
@@ -12,9 +12,10 @@
     <p:sldId id="264" r:id="rId6"/>
     <p:sldId id="258" r:id="rId7"/>
     <p:sldId id="259" r:id="rId8"/>
-    <p:sldId id="260" r:id="rId9"/>
-    <p:sldId id="261" r:id="rId10"/>
-    <p:sldId id="262" r:id="rId11"/>
+    <p:sldId id="267" r:id="rId9"/>
+    <p:sldId id="269" r:id="rId10"/>
+    <p:sldId id="268" r:id="rId11"/>
+    <p:sldId id="262" r:id="rId12"/>
   </p:sldIdLst>
   <p:sldSz cx="12192000" cy="6858000"/>
   <p:notesSz cx="6858000" cy="9144000"/>
@@ -268,7 +269,7 @@
           <a:p>
             <a:fld id="{94AF7B9F-3A11-934B-9C29-5145B1FA1C2C}" type="datetimeFigureOut">
               <a:rPr lang="en-US" smtClean="0"/>
-              <a:t>5/13/22</a:t>
+              <a:t>10/19/22</a:t>
             </a:fld>
             <a:endParaRPr lang="en-US"/>
           </a:p>
@@ -466,7 +467,7 @@
           <a:p>
             <a:fld id="{94AF7B9F-3A11-934B-9C29-5145B1FA1C2C}" type="datetimeFigureOut">
               <a:rPr lang="en-US" smtClean="0"/>
-              <a:t>5/13/22</a:t>
+              <a:t>10/19/22</a:t>
             </a:fld>
             <a:endParaRPr lang="en-US"/>
           </a:p>
@@ -674,7 +675,7 @@
           <a:p>
             <a:fld id="{94AF7B9F-3A11-934B-9C29-5145B1FA1C2C}" type="datetimeFigureOut">
               <a:rPr lang="en-US" smtClean="0"/>
-              <a:t>5/13/22</a:t>
+              <a:t>10/19/22</a:t>
             </a:fld>
             <a:endParaRPr lang="en-US"/>
           </a:p>
@@ -872,7 +873,7 @@
           <a:p>
             <a:fld id="{94AF7B9F-3A11-934B-9C29-5145B1FA1C2C}" type="datetimeFigureOut">
               <a:rPr lang="en-US" smtClean="0"/>
-              <a:t>5/13/22</a:t>
+              <a:t>10/19/22</a:t>
             </a:fld>
             <a:endParaRPr lang="en-US"/>
           </a:p>
@@ -1147,7 +1148,7 @@
           <a:p>
             <a:fld id="{94AF7B9F-3A11-934B-9C29-5145B1FA1C2C}" type="datetimeFigureOut">
               <a:rPr lang="en-US" smtClean="0"/>
-              <a:t>5/13/22</a:t>
+              <a:t>10/19/22</a:t>
             </a:fld>
             <a:endParaRPr lang="en-US"/>
           </a:p>
@@ -1412,7 +1413,7 @@
           <a:p>
             <a:fld id="{94AF7B9F-3A11-934B-9C29-5145B1FA1C2C}" type="datetimeFigureOut">
               <a:rPr lang="en-US" smtClean="0"/>
-              <a:t>5/13/22</a:t>
+              <a:t>10/19/22</a:t>
             </a:fld>
             <a:endParaRPr lang="en-US"/>
           </a:p>
@@ -1824,7 +1825,7 @@
           <a:p>
             <a:fld id="{94AF7B9F-3A11-934B-9C29-5145B1FA1C2C}" type="datetimeFigureOut">
               <a:rPr lang="en-US" smtClean="0"/>
-              <a:t>5/13/22</a:t>
+              <a:t>10/19/22</a:t>
             </a:fld>
             <a:endParaRPr lang="en-US"/>
           </a:p>
@@ -1965,7 +1966,7 @@
           <a:p>
             <a:fld id="{94AF7B9F-3A11-934B-9C29-5145B1FA1C2C}" type="datetimeFigureOut">
               <a:rPr lang="en-US" smtClean="0"/>
-              <a:t>5/13/22</a:t>
+              <a:t>10/19/22</a:t>
             </a:fld>
             <a:endParaRPr lang="en-US"/>
           </a:p>
@@ -2078,7 +2079,7 @@
           <a:p>
             <a:fld id="{94AF7B9F-3A11-934B-9C29-5145B1FA1C2C}" type="datetimeFigureOut">
               <a:rPr lang="en-US" smtClean="0"/>
-              <a:t>5/13/22</a:t>
+              <a:t>10/19/22</a:t>
             </a:fld>
             <a:endParaRPr lang="en-US"/>
           </a:p>
@@ -2389,7 +2390,7 @@
           <a:p>
             <a:fld id="{94AF7B9F-3A11-934B-9C29-5145B1FA1C2C}" type="datetimeFigureOut">
               <a:rPr lang="en-US" smtClean="0"/>
-              <a:t>5/13/22</a:t>
+              <a:t>10/19/22</a:t>
             </a:fld>
             <a:endParaRPr lang="en-US"/>
           </a:p>
@@ -2677,7 +2678,7 @@
           <a:p>
             <a:fld id="{94AF7B9F-3A11-934B-9C29-5145B1FA1C2C}" type="datetimeFigureOut">
               <a:rPr lang="en-US" smtClean="0"/>
-              <a:t>5/13/22</a:t>
+              <a:t>10/19/22</a:t>
             </a:fld>
             <a:endParaRPr lang="en-US"/>
           </a:p>
@@ -2918,7 +2919,7 @@
           <a:p>
             <a:fld id="{94AF7B9F-3A11-934B-9C29-5145B1FA1C2C}" type="datetimeFigureOut">
               <a:rPr lang="en-US" smtClean="0"/>
-              <a:t>5/13/22</a:t>
+              <a:t>10/19/22</a:t>
             </a:fld>
             <a:endParaRPr lang="en-US"/>
           </a:p>
@@ -3397,6 +3398,2265 @@
       </p:grpSpPr>
       <p:pic>
         <p:nvPicPr>
+          <p:cNvPr id="59" name="Picture 58" descr="A person covering her face with her hands&#10;&#10;Description automatically generated">
+            <a:extLst>
+              <a:ext uri="{FF2B5EF4-FFF2-40B4-BE49-F238E27FC236}">
+                <a16:creationId xmlns:a16="http://schemas.microsoft.com/office/drawing/2014/main" id="{5059D98B-2E24-172B-35A2-F4123BE4C61E}"/>
+              </a:ext>
+            </a:extLst>
+          </p:cNvPr>
+          <p:cNvPicPr>
+            <a:picLocks noChangeAspect="1"/>
+          </p:cNvPicPr>
+          <p:nvPr/>
+        </p:nvPicPr>
+        <p:blipFill>
+          <a:blip r:embed="rId2"/>
+          <a:stretch>
+            <a:fillRect/>
+          </a:stretch>
+        </p:blipFill>
+        <p:spPr>
+          <a:xfrm>
+            <a:off x="3936956" y="402952"/>
+            <a:ext cx="1366586" cy="1530806"/>
+          </a:xfrm>
+          <a:prstGeom prst="rect">
+            <a:avLst/>
+          </a:prstGeom>
+        </p:spPr>
+      </p:pic>
+      <p:pic>
+        <p:nvPicPr>
+          <p:cNvPr id="58" name="Picture 57">
+            <a:extLst>
+              <a:ext uri="{FF2B5EF4-FFF2-40B4-BE49-F238E27FC236}">
+                <a16:creationId xmlns:a16="http://schemas.microsoft.com/office/drawing/2014/main" id="{72C655E1-F8FF-E409-F8DA-63DCA7C4A11F}"/>
+              </a:ext>
+            </a:extLst>
+          </p:cNvPr>
+          <p:cNvPicPr>
+            <a:picLocks noChangeAspect="1"/>
+          </p:cNvPicPr>
+          <p:nvPr/>
+        </p:nvPicPr>
+        <p:blipFill>
+          <a:blip r:embed="rId3"/>
+          <a:stretch>
+            <a:fillRect/>
+          </a:stretch>
+        </p:blipFill>
+        <p:spPr>
+          <a:xfrm flipH="1" flipV="1">
+            <a:off x="5322809" y="1538818"/>
+            <a:ext cx="1664238" cy="1720973"/>
+          </a:xfrm>
+          <a:prstGeom prst="rect">
+            <a:avLst/>
+          </a:prstGeom>
+        </p:spPr>
+      </p:pic>
+      <p:pic>
+        <p:nvPicPr>
+          <p:cNvPr id="57" name="Picture 56">
+            <a:extLst>
+              <a:ext uri="{FF2B5EF4-FFF2-40B4-BE49-F238E27FC236}">
+                <a16:creationId xmlns:a16="http://schemas.microsoft.com/office/drawing/2014/main" id="{F60B8D03-43D8-72F9-E77F-051EDF165552}"/>
+              </a:ext>
+            </a:extLst>
+          </p:cNvPr>
+          <p:cNvPicPr>
+            <a:picLocks noChangeAspect="1"/>
+          </p:cNvPicPr>
+          <p:nvPr/>
+        </p:nvPicPr>
+        <p:blipFill>
+          <a:blip r:embed="rId3"/>
+          <a:stretch>
+            <a:fillRect/>
+          </a:stretch>
+        </p:blipFill>
+        <p:spPr>
+          <a:xfrm flipH="1" flipV="1">
+            <a:off x="9998798" y="1392391"/>
+            <a:ext cx="1664238" cy="1720973"/>
+          </a:xfrm>
+          <a:prstGeom prst="rect">
+            <a:avLst/>
+          </a:prstGeom>
+        </p:spPr>
+      </p:pic>
+      <p:sp>
+        <p:nvSpPr>
+          <p:cNvPr id="6" name="Action Button: Document 5">
+            <a:hlinkClick r:id="" action="ppaction://noaction" highlightClick="1"/>
+            <a:extLst>
+              <a:ext uri="{FF2B5EF4-FFF2-40B4-BE49-F238E27FC236}">
+                <a16:creationId xmlns:a16="http://schemas.microsoft.com/office/drawing/2014/main" id="{68EB5451-2B88-DD44-8945-00EC239C8048}"/>
+              </a:ext>
+            </a:extLst>
+          </p:cNvPr>
+          <p:cNvSpPr/>
+          <p:nvPr/>
+        </p:nvSpPr>
+        <p:spPr>
+          <a:xfrm>
+            <a:off x="5187351" y="3286623"/>
+            <a:ext cx="987973" cy="1090449"/>
+          </a:xfrm>
+          <a:prstGeom prst="actionButtonDocument">
+            <a:avLst/>
+          </a:prstGeom>
+          <a:solidFill>
+            <a:schemeClr val="accent2">
+              <a:lumMod val="60000"/>
+              <a:lumOff val="40000"/>
+            </a:schemeClr>
+          </a:solidFill>
+          <a:ln>
+            <a:solidFill>
+              <a:schemeClr val="bg1"/>
+            </a:solidFill>
+          </a:ln>
+        </p:spPr>
+        <p:style>
+          <a:lnRef idx="2">
+            <a:schemeClr val="accent1">
+              <a:shade val="50000"/>
+            </a:schemeClr>
+          </a:lnRef>
+          <a:fillRef idx="1">
+            <a:schemeClr val="accent1"/>
+          </a:fillRef>
+          <a:effectRef idx="0">
+            <a:schemeClr val="accent1"/>
+          </a:effectRef>
+          <a:fontRef idx="minor">
+            <a:schemeClr val="lt1"/>
+          </a:fontRef>
+        </p:style>
+        <p:txBody>
+          <a:bodyPr rtlCol="0" anchor="ctr"/>
+          <a:lstStyle/>
+          <a:p>
+            <a:pPr algn="ctr"/>
+            <a:endParaRPr lang="en-US"/>
+          </a:p>
+        </p:txBody>
+      </p:sp>
+      <p:sp>
+        <p:nvSpPr>
+          <p:cNvPr id="7" name="Action Button: Document 6">
+            <a:hlinkClick r:id="" action="ppaction://noaction" highlightClick="1"/>
+            <a:extLst>
+              <a:ext uri="{FF2B5EF4-FFF2-40B4-BE49-F238E27FC236}">
+                <a16:creationId xmlns:a16="http://schemas.microsoft.com/office/drawing/2014/main" id="{CF3C8680-CCE6-8841-A3C3-E5222E4B433D}"/>
+              </a:ext>
+            </a:extLst>
+          </p:cNvPr>
+          <p:cNvSpPr/>
+          <p:nvPr/>
+        </p:nvSpPr>
+        <p:spPr>
+          <a:xfrm>
+            <a:off x="7768069" y="3256149"/>
+            <a:ext cx="987973" cy="1090449"/>
+          </a:xfrm>
+          <a:prstGeom prst="actionButtonDocument">
+            <a:avLst/>
+          </a:prstGeom>
+          <a:solidFill>
+            <a:schemeClr val="accent2">
+              <a:lumMod val="60000"/>
+              <a:lumOff val="40000"/>
+            </a:schemeClr>
+          </a:solidFill>
+          <a:ln>
+            <a:solidFill>
+              <a:schemeClr val="bg1"/>
+            </a:solidFill>
+          </a:ln>
+        </p:spPr>
+        <p:style>
+          <a:lnRef idx="2">
+            <a:schemeClr val="accent1">
+              <a:shade val="50000"/>
+            </a:schemeClr>
+          </a:lnRef>
+          <a:fillRef idx="1">
+            <a:schemeClr val="accent1"/>
+          </a:fillRef>
+          <a:effectRef idx="0">
+            <a:schemeClr val="accent1"/>
+          </a:effectRef>
+          <a:fontRef idx="minor">
+            <a:schemeClr val="lt1"/>
+          </a:fontRef>
+        </p:style>
+        <p:txBody>
+          <a:bodyPr rtlCol="0" anchor="ctr"/>
+          <a:lstStyle/>
+          <a:p>
+            <a:pPr algn="ctr"/>
+            <a:endParaRPr lang="en-US"/>
+          </a:p>
+        </p:txBody>
+      </p:sp>
+      <p:sp>
+        <p:nvSpPr>
+          <p:cNvPr id="8" name="Action Button: Document 7">
+            <a:hlinkClick r:id="" action="ppaction://noaction" highlightClick="1"/>
+            <a:extLst>
+              <a:ext uri="{FF2B5EF4-FFF2-40B4-BE49-F238E27FC236}">
+                <a16:creationId xmlns:a16="http://schemas.microsoft.com/office/drawing/2014/main" id="{2C3D39BA-FD92-8145-AC8F-0CD30F3815C3}"/>
+              </a:ext>
+            </a:extLst>
+          </p:cNvPr>
+          <p:cNvSpPr/>
+          <p:nvPr/>
+        </p:nvSpPr>
+        <p:spPr>
+          <a:xfrm>
+            <a:off x="10307639" y="3218649"/>
+            <a:ext cx="987973" cy="1090449"/>
+          </a:xfrm>
+          <a:prstGeom prst="actionButtonDocument">
+            <a:avLst/>
+          </a:prstGeom>
+          <a:solidFill>
+            <a:schemeClr val="accent2">
+              <a:lumMod val="60000"/>
+              <a:lumOff val="40000"/>
+            </a:schemeClr>
+          </a:solidFill>
+          <a:ln>
+            <a:solidFill>
+              <a:schemeClr val="bg1"/>
+            </a:solidFill>
+          </a:ln>
+        </p:spPr>
+        <p:style>
+          <a:lnRef idx="2">
+            <a:schemeClr val="accent1">
+              <a:shade val="50000"/>
+            </a:schemeClr>
+          </a:lnRef>
+          <a:fillRef idx="1">
+            <a:schemeClr val="accent1"/>
+          </a:fillRef>
+          <a:effectRef idx="0">
+            <a:schemeClr val="accent1"/>
+          </a:effectRef>
+          <a:fontRef idx="minor">
+            <a:schemeClr val="lt1"/>
+          </a:fontRef>
+        </p:style>
+        <p:txBody>
+          <a:bodyPr rtlCol="0" anchor="ctr"/>
+          <a:lstStyle/>
+          <a:p>
+            <a:pPr algn="ctr"/>
+            <a:endParaRPr lang="en-US"/>
+          </a:p>
+        </p:txBody>
+      </p:sp>
+      <p:sp>
+        <p:nvSpPr>
+          <p:cNvPr id="13" name="TextBox 12">
+            <a:extLst>
+              <a:ext uri="{FF2B5EF4-FFF2-40B4-BE49-F238E27FC236}">
+                <a16:creationId xmlns:a16="http://schemas.microsoft.com/office/drawing/2014/main" id="{817F6934-60C4-1948-B134-3C57037A38E5}"/>
+              </a:ext>
+            </a:extLst>
+          </p:cNvPr>
+          <p:cNvSpPr txBox="1"/>
+          <p:nvPr/>
+        </p:nvSpPr>
+        <p:spPr>
+          <a:xfrm>
+            <a:off x="2622760" y="4426461"/>
+            <a:ext cx="1318823" cy="369332"/>
+          </a:xfrm>
+          <a:prstGeom prst="rect">
+            <a:avLst/>
+          </a:prstGeom>
+          <a:noFill/>
+        </p:spPr>
+        <p:txBody>
+          <a:bodyPr wrap="none" rtlCol="0">
+            <a:spAutoFit/>
+          </a:bodyPr>
+          <a:lstStyle/>
+          <a:p>
+            <a:r>
+              <a:rPr lang="en-US" dirty="0"/>
+              <a:t>02-tidy.Rmd</a:t>
+            </a:r>
+          </a:p>
+        </p:txBody>
+      </p:sp>
+      <p:sp>
+        <p:nvSpPr>
+          <p:cNvPr id="14" name="TextBox 13">
+            <a:extLst>
+              <a:ext uri="{FF2B5EF4-FFF2-40B4-BE49-F238E27FC236}">
+                <a16:creationId xmlns:a16="http://schemas.microsoft.com/office/drawing/2014/main" id="{25077233-DC85-694C-8BD7-4E85BFC0DD66}"/>
+              </a:ext>
+            </a:extLst>
+          </p:cNvPr>
+          <p:cNvSpPr txBox="1"/>
+          <p:nvPr/>
+        </p:nvSpPr>
+        <p:spPr>
+          <a:xfrm>
+            <a:off x="43467" y="4427239"/>
+            <a:ext cx="1616148" cy="369332"/>
+          </a:xfrm>
+          <a:prstGeom prst="rect">
+            <a:avLst/>
+          </a:prstGeom>
+          <a:noFill/>
+        </p:spPr>
+        <p:txBody>
+          <a:bodyPr wrap="square" rtlCol="0">
+            <a:spAutoFit/>
+          </a:bodyPr>
+          <a:lstStyle/>
+          <a:p>
+            <a:r>
+              <a:rPr lang="en-US" dirty="0"/>
+              <a:t>01-import.Rmd</a:t>
+            </a:r>
+          </a:p>
+        </p:txBody>
+      </p:sp>
+      <p:sp>
+        <p:nvSpPr>
+          <p:cNvPr id="15" name="TextBox 14">
+            <a:extLst>
+              <a:ext uri="{FF2B5EF4-FFF2-40B4-BE49-F238E27FC236}">
+                <a16:creationId xmlns:a16="http://schemas.microsoft.com/office/drawing/2014/main" id="{A2E9674F-3B03-DE46-97CA-9B7427C7A466}"/>
+              </a:ext>
+            </a:extLst>
+          </p:cNvPr>
+          <p:cNvSpPr txBox="1"/>
+          <p:nvPr/>
+        </p:nvSpPr>
+        <p:spPr>
+          <a:xfrm>
+            <a:off x="4843167" y="4391569"/>
+            <a:ext cx="1664238" cy="369332"/>
+          </a:xfrm>
+          <a:prstGeom prst="rect">
+            <a:avLst/>
+          </a:prstGeom>
+          <a:noFill/>
+        </p:spPr>
+        <p:txBody>
+          <a:bodyPr wrap="none" rtlCol="0">
+            <a:spAutoFit/>
+          </a:bodyPr>
+          <a:lstStyle/>
+          <a:p>
+            <a:r>
+              <a:rPr lang="en-US" dirty="0"/>
+              <a:t>03-models.Rmd</a:t>
+            </a:r>
+          </a:p>
+        </p:txBody>
+      </p:sp>
+      <p:sp>
+        <p:nvSpPr>
+          <p:cNvPr id="18" name="TextBox 17">
+            <a:extLst>
+              <a:ext uri="{FF2B5EF4-FFF2-40B4-BE49-F238E27FC236}">
+                <a16:creationId xmlns:a16="http://schemas.microsoft.com/office/drawing/2014/main" id="{15BA7C0C-5DE3-324D-987E-CCBD86F2171A}"/>
+              </a:ext>
+            </a:extLst>
+          </p:cNvPr>
+          <p:cNvSpPr txBox="1"/>
+          <p:nvPr/>
+        </p:nvSpPr>
+        <p:spPr>
+          <a:xfrm>
+            <a:off x="7408989" y="4375903"/>
+            <a:ext cx="1762790" cy="369332"/>
+          </a:xfrm>
+          <a:prstGeom prst="rect">
+            <a:avLst/>
+          </a:prstGeom>
+          <a:noFill/>
+        </p:spPr>
+        <p:txBody>
+          <a:bodyPr wrap="none" rtlCol="0">
+            <a:spAutoFit/>
+          </a:bodyPr>
+          <a:lstStyle/>
+          <a:p>
+            <a:r>
+              <a:rPr lang="en-US" dirty="0"/>
+              <a:t>04-visualize.Rmd</a:t>
+            </a:r>
+          </a:p>
+        </p:txBody>
+      </p:sp>
+      <p:sp>
+        <p:nvSpPr>
+          <p:cNvPr id="19" name="TextBox 18">
+            <a:extLst>
+              <a:ext uri="{FF2B5EF4-FFF2-40B4-BE49-F238E27FC236}">
+                <a16:creationId xmlns:a16="http://schemas.microsoft.com/office/drawing/2014/main" id="{0D3529FA-493C-D340-917E-D2BE38F4E151}"/>
+              </a:ext>
+            </a:extLst>
+          </p:cNvPr>
+          <p:cNvSpPr txBox="1"/>
+          <p:nvPr/>
+        </p:nvSpPr>
+        <p:spPr>
+          <a:xfrm>
+            <a:off x="9673976" y="4346598"/>
+            <a:ext cx="2255297" cy="369332"/>
+          </a:xfrm>
+          <a:prstGeom prst="rect">
+            <a:avLst/>
+          </a:prstGeom>
+          <a:noFill/>
+        </p:spPr>
+        <p:txBody>
+          <a:bodyPr wrap="none" rtlCol="0">
+            <a:spAutoFit/>
+          </a:bodyPr>
+          <a:lstStyle/>
+          <a:p>
+            <a:r>
+              <a:rPr lang="en-US" dirty="0"/>
+              <a:t>05-communicate.Rmd</a:t>
+            </a:r>
+          </a:p>
+        </p:txBody>
+      </p:sp>
+      <p:sp>
+        <p:nvSpPr>
+          <p:cNvPr id="20" name="Right Arrow 19">
+            <a:extLst>
+              <a:ext uri="{FF2B5EF4-FFF2-40B4-BE49-F238E27FC236}">
+                <a16:creationId xmlns:a16="http://schemas.microsoft.com/office/drawing/2014/main" id="{519AB274-0280-634F-90B3-89BCB6CD12EA}"/>
+              </a:ext>
+            </a:extLst>
+          </p:cNvPr>
+          <p:cNvSpPr/>
+          <p:nvPr/>
+        </p:nvSpPr>
+        <p:spPr>
+          <a:xfrm rot="3061977">
+            <a:off x="2864855" y="4988972"/>
+            <a:ext cx="743903" cy="364034"/>
+          </a:xfrm>
+          <a:prstGeom prst="rightArrow">
+            <a:avLst/>
+          </a:prstGeom>
+          <a:solidFill>
+            <a:schemeClr val="accent3"/>
+          </a:solidFill>
+          <a:ln>
+            <a:noFill/>
+          </a:ln>
+        </p:spPr>
+        <p:style>
+          <a:lnRef idx="2">
+            <a:schemeClr val="accent1">
+              <a:shade val="50000"/>
+            </a:schemeClr>
+          </a:lnRef>
+          <a:fillRef idx="1">
+            <a:schemeClr val="accent1"/>
+          </a:fillRef>
+          <a:effectRef idx="0">
+            <a:schemeClr val="accent1"/>
+          </a:effectRef>
+          <a:fontRef idx="minor">
+            <a:schemeClr val="lt1"/>
+          </a:fontRef>
+        </p:style>
+        <p:txBody>
+          <a:bodyPr rtlCol="0" anchor="ctr"/>
+          <a:lstStyle/>
+          <a:p>
+            <a:pPr algn="ctr"/>
+            <a:endParaRPr lang="en-US">
+              <a:solidFill>
+                <a:srgbClr val="FF0000"/>
+              </a:solidFill>
+              <a:highlight>
+                <a:srgbClr val="FA8538"/>
+              </a:highlight>
+            </a:endParaRPr>
+          </a:p>
+        </p:txBody>
+      </p:sp>
+      <p:sp>
+        <p:nvSpPr>
+          <p:cNvPr id="21" name="Right Arrow 20">
+            <a:extLst>
+              <a:ext uri="{FF2B5EF4-FFF2-40B4-BE49-F238E27FC236}">
+                <a16:creationId xmlns:a16="http://schemas.microsoft.com/office/drawing/2014/main" id="{A4F0C651-E7B4-0D48-83A4-11637097C025}"/>
+              </a:ext>
+            </a:extLst>
+          </p:cNvPr>
+          <p:cNvSpPr/>
+          <p:nvPr/>
+        </p:nvSpPr>
+        <p:spPr>
+          <a:xfrm rot="15522002">
+            <a:off x="8398123" y="4645859"/>
+            <a:ext cx="225532" cy="420414"/>
+          </a:xfrm>
+          <a:prstGeom prst="rightArrow">
+            <a:avLst/>
+          </a:prstGeom>
+          <a:solidFill>
+            <a:schemeClr val="accent3"/>
+          </a:solidFill>
+          <a:ln>
+            <a:noFill/>
+          </a:ln>
+        </p:spPr>
+        <p:style>
+          <a:lnRef idx="2">
+            <a:schemeClr val="accent1">
+              <a:shade val="50000"/>
+            </a:schemeClr>
+          </a:lnRef>
+          <a:fillRef idx="1">
+            <a:schemeClr val="accent1"/>
+          </a:fillRef>
+          <a:effectRef idx="0">
+            <a:schemeClr val="accent1"/>
+          </a:effectRef>
+          <a:fontRef idx="minor">
+            <a:schemeClr val="lt1"/>
+          </a:fontRef>
+        </p:style>
+        <p:txBody>
+          <a:bodyPr rtlCol="0" anchor="ctr"/>
+          <a:lstStyle/>
+          <a:p>
+            <a:pPr algn="ctr"/>
+            <a:endParaRPr lang="en-US">
+              <a:solidFill>
+                <a:srgbClr val="FF0000"/>
+              </a:solidFill>
+              <a:highlight>
+                <a:srgbClr val="FA8538"/>
+              </a:highlight>
+            </a:endParaRPr>
+          </a:p>
+        </p:txBody>
+      </p:sp>
+      <p:sp>
+        <p:nvSpPr>
+          <p:cNvPr id="23" name="Right Arrow 22">
+            <a:extLst>
+              <a:ext uri="{FF2B5EF4-FFF2-40B4-BE49-F238E27FC236}">
+                <a16:creationId xmlns:a16="http://schemas.microsoft.com/office/drawing/2014/main" id="{A1773BE5-6031-A44B-B46F-DCA2CE78B843}"/>
+              </a:ext>
+            </a:extLst>
+          </p:cNvPr>
+          <p:cNvSpPr/>
+          <p:nvPr/>
+        </p:nvSpPr>
+        <p:spPr>
+          <a:xfrm rot="3726193">
+            <a:off x="923731" y="4918865"/>
+            <a:ext cx="644694" cy="420414"/>
+          </a:xfrm>
+          <a:prstGeom prst="rightArrow">
+            <a:avLst/>
+          </a:prstGeom>
+          <a:solidFill>
+            <a:schemeClr val="bg2">
+              <a:lumMod val="75000"/>
+            </a:schemeClr>
+          </a:solidFill>
+          <a:ln>
+            <a:noFill/>
+          </a:ln>
+        </p:spPr>
+        <p:style>
+          <a:lnRef idx="2">
+            <a:schemeClr val="accent1">
+              <a:shade val="50000"/>
+            </a:schemeClr>
+          </a:lnRef>
+          <a:fillRef idx="1">
+            <a:schemeClr val="accent1"/>
+          </a:fillRef>
+          <a:effectRef idx="0">
+            <a:schemeClr val="accent1"/>
+          </a:effectRef>
+          <a:fontRef idx="minor">
+            <a:schemeClr val="lt1"/>
+          </a:fontRef>
+        </p:style>
+        <p:txBody>
+          <a:bodyPr rtlCol="0" anchor="ctr"/>
+          <a:lstStyle/>
+          <a:p>
+            <a:pPr algn="ctr"/>
+            <a:endParaRPr lang="en-US"/>
+          </a:p>
+        </p:txBody>
+      </p:sp>
+      <p:sp>
+        <p:nvSpPr>
+          <p:cNvPr id="63" name="Action Button: Document 62">
+            <a:hlinkClick r:id="" action="ppaction://noaction" highlightClick="1"/>
+            <a:extLst>
+              <a:ext uri="{FF2B5EF4-FFF2-40B4-BE49-F238E27FC236}">
+                <a16:creationId xmlns:a16="http://schemas.microsoft.com/office/drawing/2014/main" id="{AD49C542-D153-024F-AEB1-F7B58C99CD2E}"/>
+              </a:ext>
+            </a:extLst>
+          </p:cNvPr>
+          <p:cNvSpPr/>
+          <p:nvPr/>
+        </p:nvSpPr>
+        <p:spPr>
+          <a:xfrm>
+            <a:off x="2777508" y="3286622"/>
+            <a:ext cx="987973" cy="1090449"/>
+          </a:xfrm>
+          <a:prstGeom prst="actionButtonDocument">
+            <a:avLst/>
+          </a:prstGeom>
+          <a:solidFill>
+            <a:schemeClr val="accent2">
+              <a:lumMod val="60000"/>
+              <a:lumOff val="40000"/>
+            </a:schemeClr>
+          </a:solidFill>
+          <a:ln>
+            <a:solidFill>
+              <a:schemeClr val="bg1"/>
+            </a:solidFill>
+          </a:ln>
+        </p:spPr>
+        <p:style>
+          <a:lnRef idx="2">
+            <a:schemeClr val="accent1">
+              <a:shade val="50000"/>
+            </a:schemeClr>
+          </a:lnRef>
+          <a:fillRef idx="1">
+            <a:schemeClr val="accent1"/>
+          </a:fillRef>
+          <a:effectRef idx="0">
+            <a:schemeClr val="accent1"/>
+          </a:effectRef>
+          <a:fontRef idx="minor">
+            <a:schemeClr val="lt1"/>
+          </a:fontRef>
+        </p:style>
+        <p:txBody>
+          <a:bodyPr rtlCol="0" anchor="ctr"/>
+          <a:lstStyle/>
+          <a:p>
+            <a:pPr algn="ctr"/>
+            <a:endParaRPr lang="en-US"/>
+          </a:p>
+        </p:txBody>
+      </p:sp>
+      <p:sp>
+        <p:nvSpPr>
+          <p:cNvPr id="64" name="Action Button: Document 63">
+            <a:hlinkClick r:id="" action="ppaction://noaction" highlightClick="1"/>
+            <a:extLst>
+              <a:ext uri="{FF2B5EF4-FFF2-40B4-BE49-F238E27FC236}">
+                <a16:creationId xmlns:a16="http://schemas.microsoft.com/office/drawing/2014/main" id="{4D555BF3-0372-E242-9F6A-0F07B4700627}"/>
+              </a:ext>
+            </a:extLst>
+          </p:cNvPr>
+          <p:cNvSpPr/>
+          <p:nvPr/>
+        </p:nvSpPr>
+        <p:spPr>
+          <a:xfrm>
+            <a:off x="398014" y="3274737"/>
+            <a:ext cx="987973" cy="1090449"/>
+          </a:xfrm>
+          <a:prstGeom prst="actionButtonDocument">
+            <a:avLst/>
+          </a:prstGeom>
+          <a:solidFill>
+            <a:schemeClr val="accent2">
+              <a:lumMod val="60000"/>
+              <a:lumOff val="40000"/>
+            </a:schemeClr>
+          </a:solidFill>
+          <a:ln>
+            <a:solidFill>
+              <a:schemeClr val="bg1"/>
+            </a:solidFill>
+          </a:ln>
+        </p:spPr>
+        <p:style>
+          <a:lnRef idx="2">
+            <a:schemeClr val="accent1">
+              <a:shade val="50000"/>
+            </a:schemeClr>
+          </a:lnRef>
+          <a:fillRef idx="1">
+            <a:schemeClr val="accent1"/>
+          </a:fillRef>
+          <a:effectRef idx="0">
+            <a:schemeClr val="accent1"/>
+          </a:effectRef>
+          <a:fontRef idx="minor">
+            <a:schemeClr val="lt1"/>
+          </a:fontRef>
+        </p:style>
+        <p:txBody>
+          <a:bodyPr rtlCol="0" anchor="ctr"/>
+          <a:lstStyle/>
+          <a:p>
+            <a:pPr algn="ctr"/>
+            <a:endParaRPr lang="en-US"/>
+          </a:p>
+        </p:txBody>
+      </p:sp>
+      <p:sp>
+        <p:nvSpPr>
+          <p:cNvPr id="27" name="Action Button: Document 26">
+            <a:hlinkClick r:id="" action="ppaction://noaction" highlightClick="1"/>
+            <a:extLst>
+              <a:ext uri="{FF2B5EF4-FFF2-40B4-BE49-F238E27FC236}">
+                <a16:creationId xmlns:a16="http://schemas.microsoft.com/office/drawing/2014/main" id="{D0573F44-0D64-5F85-1FAC-E0EB41DB8892}"/>
+              </a:ext>
+            </a:extLst>
+          </p:cNvPr>
+          <p:cNvSpPr/>
+          <p:nvPr/>
+        </p:nvSpPr>
+        <p:spPr>
+          <a:xfrm>
+            <a:off x="4974172" y="5366408"/>
+            <a:ext cx="987973" cy="1090449"/>
+          </a:xfrm>
+          <a:prstGeom prst="actionButtonDocument">
+            <a:avLst/>
+          </a:prstGeom>
+          <a:solidFill>
+            <a:schemeClr val="accent2">
+              <a:lumMod val="60000"/>
+              <a:lumOff val="40000"/>
+            </a:schemeClr>
+          </a:solidFill>
+          <a:ln>
+            <a:solidFill>
+              <a:schemeClr val="bg1"/>
+            </a:solidFill>
+          </a:ln>
+        </p:spPr>
+        <p:style>
+          <a:lnRef idx="2">
+            <a:schemeClr val="accent1">
+              <a:shade val="50000"/>
+            </a:schemeClr>
+          </a:lnRef>
+          <a:fillRef idx="1">
+            <a:schemeClr val="accent1"/>
+          </a:fillRef>
+          <a:effectRef idx="0">
+            <a:schemeClr val="accent1"/>
+          </a:effectRef>
+          <a:fontRef idx="minor">
+            <a:schemeClr val="lt1"/>
+          </a:fontRef>
+        </p:style>
+        <p:txBody>
+          <a:bodyPr rtlCol="0" anchor="ctr"/>
+          <a:lstStyle/>
+          <a:p>
+            <a:pPr algn="ctr"/>
+            <a:endParaRPr lang="en-US"/>
+          </a:p>
+        </p:txBody>
+      </p:sp>
+      <p:sp>
+        <p:nvSpPr>
+          <p:cNvPr id="28" name="TextBox 27">
+            <a:extLst>
+              <a:ext uri="{FF2B5EF4-FFF2-40B4-BE49-F238E27FC236}">
+                <a16:creationId xmlns:a16="http://schemas.microsoft.com/office/drawing/2014/main" id="{4D1D3C5D-3E94-F179-908B-D063CF7D8B43}"/>
+              </a:ext>
+            </a:extLst>
+          </p:cNvPr>
+          <p:cNvSpPr txBox="1"/>
+          <p:nvPr/>
+        </p:nvSpPr>
+        <p:spPr>
+          <a:xfrm>
+            <a:off x="4372660" y="6456857"/>
+            <a:ext cx="2346733" cy="369332"/>
+          </a:xfrm>
+          <a:prstGeom prst="rect">
+            <a:avLst/>
+          </a:prstGeom>
+          <a:noFill/>
+        </p:spPr>
+        <p:txBody>
+          <a:bodyPr wrap="none" rtlCol="0">
+            <a:spAutoFit/>
+          </a:bodyPr>
+          <a:lstStyle/>
+          <a:p>
+            <a:r>
+              <a:rPr lang="en-US" dirty="0">
+                <a:solidFill>
+                  <a:srgbClr val="FA8538"/>
+                </a:solidFill>
+              </a:rPr>
+              <a:t>02A-prep-analysis.Rmd</a:t>
+            </a:r>
+          </a:p>
+        </p:txBody>
+      </p:sp>
+      <p:sp>
+        <p:nvSpPr>
+          <p:cNvPr id="34" name="Right Arrow 33">
+            <a:extLst>
+              <a:ext uri="{FF2B5EF4-FFF2-40B4-BE49-F238E27FC236}">
+                <a16:creationId xmlns:a16="http://schemas.microsoft.com/office/drawing/2014/main" id="{E788902B-497B-C8CE-CC9A-865AADCD601E}"/>
+              </a:ext>
+            </a:extLst>
+          </p:cNvPr>
+          <p:cNvSpPr/>
+          <p:nvPr/>
+        </p:nvSpPr>
+        <p:spPr>
+          <a:xfrm rot="1787410">
+            <a:off x="6182925" y="4612841"/>
+            <a:ext cx="2297002" cy="420414"/>
+          </a:xfrm>
+          <a:prstGeom prst="rightArrow">
+            <a:avLst/>
+          </a:prstGeom>
+          <a:solidFill>
+            <a:schemeClr val="accent3"/>
+          </a:solidFill>
+          <a:ln>
+            <a:noFill/>
+          </a:ln>
+        </p:spPr>
+        <p:style>
+          <a:lnRef idx="2">
+            <a:schemeClr val="accent1">
+              <a:shade val="50000"/>
+            </a:schemeClr>
+          </a:lnRef>
+          <a:fillRef idx="1">
+            <a:schemeClr val="accent1"/>
+          </a:fillRef>
+          <a:effectRef idx="0">
+            <a:schemeClr val="accent1"/>
+          </a:effectRef>
+          <a:fontRef idx="minor">
+            <a:schemeClr val="lt1"/>
+          </a:fontRef>
+        </p:style>
+        <p:txBody>
+          <a:bodyPr rtlCol="0" anchor="ctr"/>
+          <a:lstStyle/>
+          <a:p>
+            <a:pPr algn="ctr"/>
+            <a:endParaRPr lang="en-US">
+              <a:solidFill>
+                <a:srgbClr val="FF0000"/>
+              </a:solidFill>
+              <a:highlight>
+                <a:srgbClr val="FA8538"/>
+              </a:highlight>
+            </a:endParaRPr>
+          </a:p>
+        </p:txBody>
+      </p:sp>
+      <p:sp>
+        <p:nvSpPr>
+          <p:cNvPr id="35" name="Right Arrow 34">
+            <a:extLst>
+              <a:ext uri="{FF2B5EF4-FFF2-40B4-BE49-F238E27FC236}">
+                <a16:creationId xmlns:a16="http://schemas.microsoft.com/office/drawing/2014/main" id="{F2A2D560-50E9-C2BD-E066-78B72E3693C2}"/>
+              </a:ext>
+            </a:extLst>
+          </p:cNvPr>
+          <p:cNvSpPr/>
+          <p:nvPr/>
+        </p:nvSpPr>
+        <p:spPr>
+          <a:xfrm rot="17315980">
+            <a:off x="10365278" y="4801160"/>
+            <a:ext cx="617066" cy="420414"/>
+          </a:xfrm>
+          <a:prstGeom prst="rightArrow">
+            <a:avLst/>
+          </a:prstGeom>
+          <a:solidFill>
+            <a:schemeClr val="accent3"/>
+          </a:solidFill>
+          <a:ln>
+            <a:noFill/>
+          </a:ln>
+        </p:spPr>
+        <p:style>
+          <a:lnRef idx="2">
+            <a:schemeClr val="accent1">
+              <a:shade val="50000"/>
+            </a:schemeClr>
+          </a:lnRef>
+          <a:fillRef idx="1">
+            <a:schemeClr val="accent1"/>
+          </a:fillRef>
+          <a:effectRef idx="0">
+            <a:schemeClr val="accent1"/>
+          </a:effectRef>
+          <a:fontRef idx="minor">
+            <a:schemeClr val="lt1"/>
+          </a:fontRef>
+        </p:style>
+        <p:txBody>
+          <a:bodyPr rtlCol="0" anchor="ctr"/>
+          <a:lstStyle/>
+          <a:p>
+            <a:pPr algn="ctr"/>
+            <a:endParaRPr lang="en-US">
+              <a:solidFill>
+                <a:srgbClr val="FF0000"/>
+              </a:solidFill>
+              <a:highlight>
+                <a:srgbClr val="FA8538"/>
+              </a:highlight>
+            </a:endParaRPr>
+          </a:p>
+        </p:txBody>
+      </p:sp>
+      <p:sp>
+        <p:nvSpPr>
+          <p:cNvPr id="25" name="Magnetic Disk 24">
+            <a:extLst>
+              <a:ext uri="{FF2B5EF4-FFF2-40B4-BE49-F238E27FC236}">
+                <a16:creationId xmlns:a16="http://schemas.microsoft.com/office/drawing/2014/main" id="{47A50997-CE2F-F50D-FD54-03379BFC27E4}"/>
+              </a:ext>
+            </a:extLst>
+          </p:cNvPr>
+          <p:cNvSpPr/>
+          <p:nvPr/>
+        </p:nvSpPr>
+        <p:spPr>
+          <a:xfrm>
+            <a:off x="1517472" y="5402432"/>
+            <a:ext cx="556529" cy="603318"/>
+          </a:xfrm>
+          <a:prstGeom prst="flowChartMagneticDisk">
+            <a:avLst/>
+          </a:prstGeom>
+          <a:solidFill>
+            <a:schemeClr val="accent5"/>
+          </a:solidFill>
+        </p:spPr>
+        <p:style>
+          <a:lnRef idx="2">
+            <a:schemeClr val="accent1">
+              <a:shade val="50000"/>
+            </a:schemeClr>
+          </a:lnRef>
+          <a:fillRef idx="1">
+            <a:schemeClr val="accent1"/>
+          </a:fillRef>
+          <a:effectRef idx="0">
+            <a:schemeClr val="accent1"/>
+          </a:effectRef>
+          <a:fontRef idx="minor">
+            <a:schemeClr val="lt1"/>
+          </a:fontRef>
+        </p:style>
+        <p:txBody>
+          <a:bodyPr rtlCol="0" anchor="ctr"/>
+          <a:lstStyle/>
+          <a:p>
+            <a:pPr algn="ctr"/>
+            <a:endParaRPr lang="en-US" dirty="0">
+              <a:solidFill>
+                <a:schemeClr val="accent1"/>
+              </a:solidFill>
+            </a:endParaRPr>
+          </a:p>
+        </p:txBody>
+      </p:sp>
+      <p:sp>
+        <p:nvSpPr>
+          <p:cNvPr id="26" name="Right Arrow 25">
+            <a:extLst>
+              <a:ext uri="{FF2B5EF4-FFF2-40B4-BE49-F238E27FC236}">
+                <a16:creationId xmlns:a16="http://schemas.microsoft.com/office/drawing/2014/main" id="{DE6370A8-E1F7-FD18-2335-52A70D686086}"/>
+              </a:ext>
+            </a:extLst>
+          </p:cNvPr>
+          <p:cNvSpPr/>
+          <p:nvPr/>
+        </p:nvSpPr>
+        <p:spPr>
+          <a:xfrm rot="18232847">
+            <a:off x="2001745" y="4918865"/>
+            <a:ext cx="644694" cy="420414"/>
+          </a:xfrm>
+          <a:prstGeom prst="rightArrow">
+            <a:avLst/>
+          </a:prstGeom>
+          <a:solidFill>
+            <a:schemeClr val="bg2">
+              <a:lumMod val="75000"/>
+            </a:schemeClr>
+          </a:solidFill>
+          <a:ln>
+            <a:noFill/>
+          </a:ln>
+        </p:spPr>
+        <p:style>
+          <a:lnRef idx="2">
+            <a:schemeClr val="accent1">
+              <a:shade val="50000"/>
+            </a:schemeClr>
+          </a:lnRef>
+          <a:fillRef idx="1">
+            <a:schemeClr val="accent1"/>
+          </a:fillRef>
+          <a:effectRef idx="0">
+            <a:schemeClr val="accent1"/>
+          </a:effectRef>
+          <a:fontRef idx="minor">
+            <a:schemeClr val="lt1"/>
+          </a:fontRef>
+        </p:style>
+        <p:txBody>
+          <a:bodyPr rtlCol="0" anchor="ctr"/>
+          <a:lstStyle/>
+          <a:p>
+            <a:pPr algn="ctr"/>
+            <a:endParaRPr lang="en-US"/>
+          </a:p>
+        </p:txBody>
+      </p:sp>
+      <p:sp>
+        <p:nvSpPr>
+          <p:cNvPr id="29" name="TextBox 28">
+            <a:extLst>
+              <a:ext uri="{FF2B5EF4-FFF2-40B4-BE49-F238E27FC236}">
+                <a16:creationId xmlns:a16="http://schemas.microsoft.com/office/drawing/2014/main" id="{DA59F066-EB12-92BC-DC5B-4D70826412BD}"/>
+              </a:ext>
+            </a:extLst>
+          </p:cNvPr>
+          <p:cNvSpPr txBox="1"/>
+          <p:nvPr/>
+        </p:nvSpPr>
+        <p:spPr>
+          <a:xfrm>
+            <a:off x="802372" y="6071629"/>
+            <a:ext cx="1863445" cy="369332"/>
+          </a:xfrm>
+          <a:prstGeom prst="rect">
+            <a:avLst/>
+          </a:prstGeom>
+          <a:noFill/>
+        </p:spPr>
+        <p:txBody>
+          <a:bodyPr wrap="square" rtlCol="0">
+            <a:spAutoFit/>
+          </a:bodyPr>
+          <a:lstStyle/>
+          <a:p>
+            <a:r>
+              <a:rPr lang="en-US" dirty="0"/>
+              <a:t>01-out-import.csv</a:t>
+            </a:r>
+          </a:p>
+        </p:txBody>
+      </p:sp>
+      <p:sp>
+        <p:nvSpPr>
+          <p:cNvPr id="36" name="TextBox 35">
+            <a:extLst>
+              <a:ext uri="{FF2B5EF4-FFF2-40B4-BE49-F238E27FC236}">
+                <a16:creationId xmlns:a16="http://schemas.microsoft.com/office/drawing/2014/main" id="{BB9CFC7E-495B-25C4-3ADA-BDD39A86C82C}"/>
+              </a:ext>
+            </a:extLst>
+          </p:cNvPr>
+          <p:cNvSpPr txBox="1"/>
+          <p:nvPr/>
+        </p:nvSpPr>
+        <p:spPr>
+          <a:xfrm>
+            <a:off x="2906453" y="6198699"/>
+            <a:ext cx="1589194" cy="369332"/>
+          </a:xfrm>
+          <a:prstGeom prst="rect">
+            <a:avLst/>
+          </a:prstGeom>
+          <a:noFill/>
+        </p:spPr>
+        <p:txBody>
+          <a:bodyPr wrap="square" rtlCol="0">
+            <a:spAutoFit/>
+          </a:bodyPr>
+          <a:lstStyle/>
+          <a:p>
+            <a:r>
+              <a:rPr lang="en-US" dirty="0"/>
+              <a:t>02-out-tidy.csv</a:t>
+            </a:r>
+          </a:p>
+        </p:txBody>
+      </p:sp>
+      <p:sp>
+        <p:nvSpPr>
+          <p:cNvPr id="38" name="Magnetic Disk 37">
+            <a:extLst>
+              <a:ext uri="{FF2B5EF4-FFF2-40B4-BE49-F238E27FC236}">
+                <a16:creationId xmlns:a16="http://schemas.microsoft.com/office/drawing/2014/main" id="{ACB6F7EB-D343-1713-60DA-3C2A9F8CBBBF}"/>
+              </a:ext>
+            </a:extLst>
+          </p:cNvPr>
+          <p:cNvSpPr/>
+          <p:nvPr/>
+        </p:nvSpPr>
+        <p:spPr>
+          <a:xfrm>
+            <a:off x="3380427" y="5547189"/>
+            <a:ext cx="556529" cy="603318"/>
+          </a:xfrm>
+          <a:prstGeom prst="flowChartMagneticDisk">
+            <a:avLst/>
+          </a:prstGeom>
+          <a:solidFill>
+            <a:schemeClr val="accent5"/>
+          </a:solidFill>
+        </p:spPr>
+        <p:style>
+          <a:lnRef idx="2">
+            <a:schemeClr val="accent1">
+              <a:shade val="50000"/>
+            </a:schemeClr>
+          </a:lnRef>
+          <a:fillRef idx="1">
+            <a:schemeClr val="accent1"/>
+          </a:fillRef>
+          <a:effectRef idx="0">
+            <a:schemeClr val="accent1"/>
+          </a:effectRef>
+          <a:fontRef idx="minor">
+            <a:schemeClr val="lt1"/>
+          </a:fontRef>
+        </p:style>
+        <p:txBody>
+          <a:bodyPr rtlCol="0" anchor="ctr"/>
+          <a:lstStyle/>
+          <a:p>
+            <a:pPr algn="ctr"/>
+            <a:endParaRPr lang="en-US" dirty="0">
+              <a:solidFill>
+                <a:schemeClr val="accent1"/>
+              </a:solidFill>
+            </a:endParaRPr>
+          </a:p>
+        </p:txBody>
+      </p:sp>
+      <p:sp>
+        <p:nvSpPr>
+          <p:cNvPr id="39" name="Right Arrow 38">
+            <a:extLst>
+              <a:ext uri="{FF2B5EF4-FFF2-40B4-BE49-F238E27FC236}">
+                <a16:creationId xmlns:a16="http://schemas.microsoft.com/office/drawing/2014/main" id="{2B220DF6-0226-7FE0-4192-4A83B463E2D3}"/>
+              </a:ext>
+            </a:extLst>
+          </p:cNvPr>
+          <p:cNvSpPr/>
+          <p:nvPr/>
+        </p:nvSpPr>
+        <p:spPr>
+          <a:xfrm rot="477122">
+            <a:off x="4062686" y="5763883"/>
+            <a:ext cx="893613" cy="420414"/>
+          </a:xfrm>
+          <a:prstGeom prst="rightArrow">
+            <a:avLst/>
+          </a:prstGeom>
+          <a:solidFill>
+            <a:schemeClr val="accent3"/>
+          </a:solidFill>
+          <a:ln>
+            <a:noFill/>
+          </a:ln>
+        </p:spPr>
+        <p:style>
+          <a:lnRef idx="2">
+            <a:schemeClr val="accent1">
+              <a:shade val="50000"/>
+            </a:schemeClr>
+          </a:lnRef>
+          <a:fillRef idx="1">
+            <a:schemeClr val="accent1"/>
+          </a:fillRef>
+          <a:effectRef idx="0">
+            <a:schemeClr val="accent1"/>
+          </a:effectRef>
+          <a:fontRef idx="minor">
+            <a:schemeClr val="lt1"/>
+          </a:fontRef>
+        </p:style>
+        <p:txBody>
+          <a:bodyPr rtlCol="0" anchor="ctr"/>
+          <a:lstStyle/>
+          <a:p>
+            <a:pPr algn="ctr"/>
+            <a:endParaRPr lang="en-US">
+              <a:solidFill>
+                <a:srgbClr val="FF0000"/>
+              </a:solidFill>
+              <a:highlight>
+                <a:srgbClr val="FA8538"/>
+              </a:highlight>
+            </a:endParaRPr>
+          </a:p>
+        </p:txBody>
+      </p:sp>
+      <p:sp>
+        <p:nvSpPr>
+          <p:cNvPr id="40" name="Magnetic Disk 39">
+            <a:extLst>
+              <a:ext uri="{FF2B5EF4-FFF2-40B4-BE49-F238E27FC236}">
+                <a16:creationId xmlns:a16="http://schemas.microsoft.com/office/drawing/2014/main" id="{FC09CB78-6241-24D0-E749-4A01CE7385E4}"/>
+              </a:ext>
+            </a:extLst>
+          </p:cNvPr>
+          <p:cNvSpPr/>
+          <p:nvPr/>
+        </p:nvSpPr>
+        <p:spPr>
+          <a:xfrm>
+            <a:off x="8461290" y="5009599"/>
+            <a:ext cx="556529" cy="603318"/>
+          </a:xfrm>
+          <a:prstGeom prst="flowChartMagneticDisk">
+            <a:avLst/>
+          </a:prstGeom>
+          <a:solidFill>
+            <a:schemeClr val="accent5"/>
+          </a:solidFill>
+        </p:spPr>
+        <p:style>
+          <a:lnRef idx="2">
+            <a:schemeClr val="accent1">
+              <a:shade val="50000"/>
+            </a:schemeClr>
+          </a:lnRef>
+          <a:fillRef idx="1">
+            <a:schemeClr val="accent1"/>
+          </a:fillRef>
+          <a:effectRef idx="0">
+            <a:schemeClr val="accent1"/>
+          </a:effectRef>
+          <a:fontRef idx="minor">
+            <a:schemeClr val="lt1"/>
+          </a:fontRef>
+        </p:style>
+        <p:txBody>
+          <a:bodyPr rtlCol="0" anchor="ctr"/>
+          <a:lstStyle/>
+          <a:p>
+            <a:pPr algn="ctr"/>
+            <a:endParaRPr lang="en-US" dirty="0">
+              <a:solidFill>
+                <a:schemeClr val="accent1"/>
+              </a:solidFill>
+            </a:endParaRPr>
+          </a:p>
+        </p:txBody>
+      </p:sp>
+      <p:sp>
+        <p:nvSpPr>
+          <p:cNvPr id="41" name="TextBox 40">
+            <a:extLst>
+              <a:ext uri="{FF2B5EF4-FFF2-40B4-BE49-F238E27FC236}">
+                <a16:creationId xmlns:a16="http://schemas.microsoft.com/office/drawing/2014/main" id="{C43DF7B8-3673-2165-B2B9-E235DC222827}"/>
+              </a:ext>
+            </a:extLst>
+          </p:cNvPr>
+          <p:cNvSpPr txBox="1"/>
+          <p:nvPr/>
+        </p:nvSpPr>
+        <p:spPr>
+          <a:xfrm>
+            <a:off x="7842943" y="5612917"/>
+            <a:ext cx="1989142" cy="369332"/>
+          </a:xfrm>
+          <a:prstGeom prst="rect">
+            <a:avLst/>
+          </a:prstGeom>
+          <a:noFill/>
+        </p:spPr>
+        <p:txBody>
+          <a:bodyPr wrap="square" rtlCol="0">
+            <a:spAutoFit/>
+          </a:bodyPr>
+          <a:lstStyle/>
+          <a:p>
+            <a:r>
+              <a:rPr lang="en-US" dirty="0"/>
+              <a:t>03-out-models.csv</a:t>
+            </a:r>
+          </a:p>
+        </p:txBody>
+      </p:sp>
+      <p:sp>
+        <p:nvSpPr>
+          <p:cNvPr id="42" name="Right Arrow 41">
+            <a:extLst>
+              <a:ext uri="{FF2B5EF4-FFF2-40B4-BE49-F238E27FC236}">
+                <a16:creationId xmlns:a16="http://schemas.microsoft.com/office/drawing/2014/main" id="{E74F1F11-1CE9-0355-452D-7EC063C402EE}"/>
+              </a:ext>
+            </a:extLst>
+          </p:cNvPr>
+          <p:cNvSpPr/>
+          <p:nvPr/>
+        </p:nvSpPr>
+        <p:spPr>
+          <a:xfrm rot="2894254">
+            <a:off x="8875141" y="4558844"/>
+            <a:ext cx="1369855" cy="420414"/>
+          </a:xfrm>
+          <a:prstGeom prst="rightArrow">
+            <a:avLst/>
+          </a:prstGeom>
+          <a:solidFill>
+            <a:schemeClr val="accent3"/>
+          </a:solidFill>
+          <a:ln>
+            <a:noFill/>
+          </a:ln>
+        </p:spPr>
+        <p:style>
+          <a:lnRef idx="2">
+            <a:schemeClr val="accent1">
+              <a:shade val="50000"/>
+            </a:schemeClr>
+          </a:lnRef>
+          <a:fillRef idx="1">
+            <a:schemeClr val="accent1"/>
+          </a:fillRef>
+          <a:effectRef idx="0">
+            <a:schemeClr val="accent1"/>
+          </a:effectRef>
+          <a:fontRef idx="minor">
+            <a:schemeClr val="lt1"/>
+          </a:fontRef>
+        </p:style>
+        <p:txBody>
+          <a:bodyPr rtlCol="0" anchor="ctr"/>
+          <a:lstStyle/>
+          <a:p>
+            <a:pPr algn="ctr"/>
+            <a:endParaRPr lang="en-US">
+              <a:solidFill>
+                <a:srgbClr val="FF0000"/>
+              </a:solidFill>
+              <a:highlight>
+                <a:srgbClr val="FA8538"/>
+              </a:highlight>
+            </a:endParaRPr>
+          </a:p>
+        </p:txBody>
+      </p:sp>
+      <p:sp>
+        <p:nvSpPr>
+          <p:cNvPr id="43" name="Magnetic Disk 42">
+            <a:extLst>
+              <a:ext uri="{FF2B5EF4-FFF2-40B4-BE49-F238E27FC236}">
+                <a16:creationId xmlns:a16="http://schemas.microsoft.com/office/drawing/2014/main" id="{8783CAB2-B832-15EF-FB45-8F12CADF1F0F}"/>
+              </a:ext>
+            </a:extLst>
+          </p:cNvPr>
+          <p:cNvSpPr/>
+          <p:nvPr/>
+        </p:nvSpPr>
+        <p:spPr>
+          <a:xfrm>
+            <a:off x="10074328" y="5418199"/>
+            <a:ext cx="556529" cy="603318"/>
+          </a:xfrm>
+          <a:prstGeom prst="flowChartMagneticDisk">
+            <a:avLst/>
+          </a:prstGeom>
+          <a:solidFill>
+            <a:schemeClr val="accent5"/>
+          </a:solidFill>
+        </p:spPr>
+        <p:style>
+          <a:lnRef idx="2">
+            <a:schemeClr val="accent1">
+              <a:shade val="50000"/>
+            </a:schemeClr>
+          </a:lnRef>
+          <a:fillRef idx="1">
+            <a:schemeClr val="accent1"/>
+          </a:fillRef>
+          <a:effectRef idx="0">
+            <a:schemeClr val="accent1"/>
+          </a:effectRef>
+          <a:fontRef idx="minor">
+            <a:schemeClr val="lt1"/>
+          </a:fontRef>
+        </p:style>
+        <p:txBody>
+          <a:bodyPr rtlCol="0" anchor="ctr"/>
+          <a:lstStyle/>
+          <a:p>
+            <a:pPr algn="ctr"/>
+            <a:endParaRPr lang="en-US" dirty="0">
+              <a:solidFill>
+                <a:schemeClr val="accent1"/>
+              </a:solidFill>
+            </a:endParaRPr>
+          </a:p>
+        </p:txBody>
+      </p:sp>
+      <p:sp>
+        <p:nvSpPr>
+          <p:cNvPr id="44" name="TextBox 43">
+            <a:extLst>
+              <a:ext uri="{FF2B5EF4-FFF2-40B4-BE49-F238E27FC236}">
+                <a16:creationId xmlns:a16="http://schemas.microsoft.com/office/drawing/2014/main" id="{3B77D63D-8031-A3E2-2ABC-7287E41C1E61}"/>
+              </a:ext>
+            </a:extLst>
+          </p:cNvPr>
+          <p:cNvSpPr txBox="1"/>
+          <p:nvPr/>
+        </p:nvSpPr>
+        <p:spPr>
+          <a:xfrm>
+            <a:off x="9621118" y="5948675"/>
+            <a:ext cx="1531886" cy="369332"/>
+          </a:xfrm>
+          <a:prstGeom prst="rect">
+            <a:avLst/>
+          </a:prstGeom>
+          <a:noFill/>
+        </p:spPr>
+        <p:txBody>
+          <a:bodyPr wrap="square" rtlCol="0">
+            <a:spAutoFit/>
+          </a:bodyPr>
+          <a:lstStyle/>
+          <a:p>
+            <a:r>
+              <a:rPr lang="en-US" dirty="0"/>
+              <a:t>04-out-vis.csv</a:t>
+            </a:r>
+          </a:p>
+        </p:txBody>
+      </p:sp>
+      <p:sp>
+        <p:nvSpPr>
+          <p:cNvPr id="33" name="Right Arrow 32">
+            <a:extLst>
+              <a:ext uri="{FF2B5EF4-FFF2-40B4-BE49-F238E27FC236}">
+                <a16:creationId xmlns:a16="http://schemas.microsoft.com/office/drawing/2014/main" id="{E5090313-0228-EEDD-EFEE-4F64B7AEE2C3}"/>
+              </a:ext>
+            </a:extLst>
+          </p:cNvPr>
+          <p:cNvSpPr/>
+          <p:nvPr/>
+        </p:nvSpPr>
+        <p:spPr>
+          <a:xfrm rot="19763741">
+            <a:off x="5998934" y="5582673"/>
+            <a:ext cx="883475" cy="420414"/>
+          </a:xfrm>
+          <a:prstGeom prst="rightArrow">
+            <a:avLst/>
+          </a:prstGeom>
+          <a:solidFill>
+            <a:schemeClr val="accent3"/>
+          </a:solidFill>
+          <a:ln>
+            <a:noFill/>
+          </a:ln>
+        </p:spPr>
+        <p:style>
+          <a:lnRef idx="2">
+            <a:schemeClr val="accent1">
+              <a:shade val="50000"/>
+            </a:schemeClr>
+          </a:lnRef>
+          <a:fillRef idx="1">
+            <a:schemeClr val="accent1"/>
+          </a:fillRef>
+          <a:effectRef idx="0">
+            <a:schemeClr val="accent1"/>
+          </a:effectRef>
+          <a:fontRef idx="minor">
+            <a:schemeClr val="lt1"/>
+          </a:fontRef>
+        </p:style>
+        <p:txBody>
+          <a:bodyPr rtlCol="0" anchor="ctr"/>
+          <a:lstStyle/>
+          <a:p>
+            <a:pPr algn="ctr"/>
+            <a:endParaRPr lang="en-US">
+              <a:solidFill>
+                <a:srgbClr val="FF0000"/>
+              </a:solidFill>
+              <a:highlight>
+                <a:srgbClr val="FA8538"/>
+              </a:highlight>
+            </a:endParaRPr>
+          </a:p>
+        </p:txBody>
+      </p:sp>
+      <p:sp>
+        <p:nvSpPr>
+          <p:cNvPr id="37" name="Right Arrow 36">
+            <a:extLst>
+              <a:ext uri="{FF2B5EF4-FFF2-40B4-BE49-F238E27FC236}">
+                <a16:creationId xmlns:a16="http://schemas.microsoft.com/office/drawing/2014/main" id="{77087220-7C31-DE4A-9ADC-07AAF119B07B}"/>
+              </a:ext>
+            </a:extLst>
+          </p:cNvPr>
+          <p:cNvSpPr/>
+          <p:nvPr/>
+        </p:nvSpPr>
+        <p:spPr>
+          <a:xfrm rot="16945038">
+            <a:off x="5263911" y="4787133"/>
+            <a:ext cx="663249" cy="420414"/>
+          </a:xfrm>
+          <a:prstGeom prst="rightArrow">
+            <a:avLst/>
+          </a:prstGeom>
+          <a:solidFill>
+            <a:schemeClr val="accent3"/>
+          </a:solidFill>
+          <a:ln>
+            <a:noFill/>
+          </a:ln>
+        </p:spPr>
+        <p:style>
+          <a:lnRef idx="2">
+            <a:schemeClr val="accent1">
+              <a:shade val="50000"/>
+            </a:schemeClr>
+          </a:lnRef>
+          <a:fillRef idx="1">
+            <a:schemeClr val="accent1"/>
+          </a:fillRef>
+          <a:effectRef idx="0">
+            <a:schemeClr val="accent1"/>
+          </a:effectRef>
+          <a:fontRef idx="minor">
+            <a:schemeClr val="lt1"/>
+          </a:fontRef>
+        </p:style>
+        <p:txBody>
+          <a:bodyPr rtlCol="0" anchor="ctr"/>
+          <a:lstStyle/>
+          <a:p>
+            <a:pPr algn="ctr"/>
+            <a:endParaRPr lang="en-US">
+              <a:solidFill>
+                <a:srgbClr val="FF0000"/>
+              </a:solidFill>
+              <a:highlight>
+                <a:srgbClr val="FA8538"/>
+              </a:highlight>
+            </a:endParaRPr>
+          </a:p>
+        </p:txBody>
+      </p:sp>
+      <p:sp>
+        <p:nvSpPr>
+          <p:cNvPr id="45" name="Magnetic Disk 44">
+            <a:extLst>
+              <a:ext uri="{FF2B5EF4-FFF2-40B4-BE49-F238E27FC236}">
+                <a16:creationId xmlns:a16="http://schemas.microsoft.com/office/drawing/2014/main" id="{A678A8A0-3949-7D0E-7973-F91BA4134F52}"/>
+              </a:ext>
+            </a:extLst>
+          </p:cNvPr>
+          <p:cNvSpPr/>
+          <p:nvPr/>
+        </p:nvSpPr>
+        <p:spPr>
+          <a:xfrm>
+            <a:off x="6877193" y="5253939"/>
+            <a:ext cx="556529" cy="603318"/>
+          </a:xfrm>
+          <a:prstGeom prst="flowChartMagneticDisk">
+            <a:avLst/>
+          </a:prstGeom>
+          <a:solidFill>
+            <a:schemeClr val="accent5"/>
+          </a:solidFill>
+        </p:spPr>
+        <p:style>
+          <a:lnRef idx="2">
+            <a:schemeClr val="accent1">
+              <a:shade val="50000"/>
+            </a:schemeClr>
+          </a:lnRef>
+          <a:fillRef idx="1">
+            <a:schemeClr val="accent1"/>
+          </a:fillRef>
+          <a:effectRef idx="0">
+            <a:schemeClr val="accent1"/>
+          </a:effectRef>
+          <a:fontRef idx="minor">
+            <a:schemeClr val="lt1"/>
+          </a:fontRef>
+        </p:style>
+        <p:txBody>
+          <a:bodyPr rtlCol="0" anchor="ctr"/>
+          <a:lstStyle/>
+          <a:p>
+            <a:pPr algn="ctr"/>
+            <a:endParaRPr lang="en-US" dirty="0">
+              <a:solidFill>
+                <a:schemeClr val="accent1"/>
+              </a:solidFill>
+            </a:endParaRPr>
+          </a:p>
+        </p:txBody>
+      </p:sp>
+      <p:sp>
+        <p:nvSpPr>
+          <p:cNvPr id="46" name="TextBox 45">
+            <a:extLst>
+              <a:ext uri="{FF2B5EF4-FFF2-40B4-BE49-F238E27FC236}">
+                <a16:creationId xmlns:a16="http://schemas.microsoft.com/office/drawing/2014/main" id="{F6AE06CC-D6C1-F67E-D839-4DC89DDE5231}"/>
+              </a:ext>
+            </a:extLst>
+          </p:cNvPr>
+          <p:cNvSpPr txBox="1"/>
+          <p:nvPr/>
+        </p:nvSpPr>
+        <p:spPr>
+          <a:xfrm>
+            <a:off x="6456764" y="5926903"/>
+            <a:ext cx="2224904" cy="369332"/>
+          </a:xfrm>
+          <a:prstGeom prst="rect">
+            <a:avLst/>
+          </a:prstGeom>
+          <a:noFill/>
+        </p:spPr>
+        <p:txBody>
+          <a:bodyPr wrap="square" rtlCol="0">
+            <a:spAutoFit/>
+          </a:bodyPr>
+          <a:lstStyle/>
+          <a:p>
+            <a:r>
+              <a:rPr lang="en-US" dirty="0"/>
+              <a:t>02A-prep-analysis.csv</a:t>
+            </a:r>
+          </a:p>
+        </p:txBody>
+      </p:sp>
+      <p:sp>
+        <p:nvSpPr>
+          <p:cNvPr id="2" name="Right Arrow 1">
+            <a:extLst>
+              <a:ext uri="{FF2B5EF4-FFF2-40B4-BE49-F238E27FC236}">
+                <a16:creationId xmlns:a16="http://schemas.microsoft.com/office/drawing/2014/main" id="{068431F6-13F5-EA07-18D3-D398127129EB}"/>
+              </a:ext>
+            </a:extLst>
+          </p:cNvPr>
+          <p:cNvSpPr/>
+          <p:nvPr/>
+        </p:nvSpPr>
+        <p:spPr>
+          <a:xfrm rot="13928203">
+            <a:off x="6191747" y="4793812"/>
+            <a:ext cx="722398" cy="420414"/>
+          </a:xfrm>
+          <a:prstGeom prst="rightArrow">
+            <a:avLst/>
+          </a:prstGeom>
+          <a:solidFill>
+            <a:schemeClr val="accent3"/>
+          </a:solidFill>
+          <a:ln>
+            <a:noFill/>
+          </a:ln>
+        </p:spPr>
+        <p:style>
+          <a:lnRef idx="2">
+            <a:schemeClr val="accent1">
+              <a:shade val="50000"/>
+            </a:schemeClr>
+          </a:lnRef>
+          <a:fillRef idx="1">
+            <a:schemeClr val="accent1"/>
+          </a:fillRef>
+          <a:effectRef idx="0">
+            <a:schemeClr val="accent1"/>
+          </a:effectRef>
+          <a:fontRef idx="minor">
+            <a:schemeClr val="lt1"/>
+          </a:fontRef>
+        </p:style>
+        <p:txBody>
+          <a:bodyPr rtlCol="0" anchor="ctr"/>
+          <a:lstStyle/>
+          <a:p>
+            <a:pPr algn="ctr"/>
+            <a:endParaRPr lang="en-US">
+              <a:solidFill>
+                <a:srgbClr val="FF0000"/>
+              </a:solidFill>
+              <a:highlight>
+                <a:srgbClr val="FA8538"/>
+              </a:highlight>
+            </a:endParaRPr>
+          </a:p>
+        </p:txBody>
+      </p:sp>
+      <p:pic>
+        <p:nvPicPr>
+          <p:cNvPr id="49" name="Picture 48">
+            <a:extLst>
+              <a:ext uri="{FF2B5EF4-FFF2-40B4-BE49-F238E27FC236}">
+                <a16:creationId xmlns:a16="http://schemas.microsoft.com/office/drawing/2014/main" id="{13644EC8-B00B-7672-3C1D-BBFE08CA9D8B}"/>
+              </a:ext>
+            </a:extLst>
+          </p:cNvPr>
+          <p:cNvPicPr>
+            <a:picLocks noChangeAspect="1"/>
+          </p:cNvPicPr>
+          <p:nvPr/>
+        </p:nvPicPr>
+        <p:blipFill>
+          <a:blip r:embed="rId3"/>
+          <a:stretch>
+            <a:fillRect/>
+          </a:stretch>
+        </p:blipFill>
+        <p:spPr>
+          <a:xfrm flipV="1">
+            <a:off x="210212" y="1471861"/>
+            <a:ext cx="1664238" cy="1720973"/>
+          </a:xfrm>
+          <a:prstGeom prst="rect">
+            <a:avLst/>
+          </a:prstGeom>
+        </p:spPr>
+      </p:pic>
+      <p:pic>
+        <p:nvPicPr>
+          <p:cNvPr id="50" name="Picture 49">
+            <a:extLst>
+              <a:ext uri="{FF2B5EF4-FFF2-40B4-BE49-F238E27FC236}">
+                <a16:creationId xmlns:a16="http://schemas.microsoft.com/office/drawing/2014/main" id="{A9512B3A-23C0-C98F-619F-31066DC01857}"/>
+              </a:ext>
+            </a:extLst>
+          </p:cNvPr>
+          <p:cNvPicPr>
+            <a:picLocks noChangeAspect="1"/>
+          </p:cNvPicPr>
+          <p:nvPr/>
+        </p:nvPicPr>
+        <p:blipFill>
+          <a:blip r:embed="rId3"/>
+          <a:stretch>
+            <a:fillRect/>
+          </a:stretch>
+        </p:blipFill>
+        <p:spPr>
+          <a:xfrm flipV="1">
+            <a:off x="2265251" y="1503298"/>
+            <a:ext cx="1664238" cy="1720973"/>
+          </a:xfrm>
+          <a:prstGeom prst="rect">
+            <a:avLst/>
+          </a:prstGeom>
+        </p:spPr>
+      </p:pic>
+      <p:pic>
+        <p:nvPicPr>
+          <p:cNvPr id="51" name="Picture 50">
+            <a:extLst>
+              <a:ext uri="{FF2B5EF4-FFF2-40B4-BE49-F238E27FC236}">
+                <a16:creationId xmlns:a16="http://schemas.microsoft.com/office/drawing/2014/main" id="{93380D2F-D8C3-57A1-23B3-371E17C8E8F1}"/>
+              </a:ext>
+            </a:extLst>
+          </p:cNvPr>
+          <p:cNvPicPr>
+            <a:picLocks noChangeAspect="1"/>
+          </p:cNvPicPr>
+          <p:nvPr/>
+        </p:nvPicPr>
+        <p:blipFill>
+          <a:blip r:embed="rId3"/>
+          <a:stretch>
+            <a:fillRect/>
+          </a:stretch>
+        </p:blipFill>
+        <p:spPr>
+          <a:xfrm flipH="1" flipV="1">
+            <a:off x="7544226" y="1505871"/>
+            <a:ext cx="1664238" cy="1720973"/>
+          </a:xfrm>
+          <a:prstGeom prst="rect">
+            <a:avLst/>
+          </a:prstGeom>
+        </p:spPr>
+      </p:pic>
+      <p:sp>
+        <p:nvSpPr>
+          <p:cNvPr id="52" name="TextBox 51">
+            <a:extLst>
+              <a:ext uri="{FF2B5EF4-FFF2-40B4-BE49-F238E27FC236}">
+                <a16:creationId xmlns:a16="http://schemas.microsoft.com/office/drawing/2014/main" id="{C4DDD70A-5DDF-518B-B9BC-51BEE5E2B92F}"/>
+              </a:ext>
+            </a:extLst>
+          </p:cNvPr>
+          <p:cNvSpPr txBox="1"/>
+          <p:nvPr/>
+        </p:nvSpPr>
+        <p:spPr>
+          <a:xfrm>
+            <a:off x="5519962" y="2380380"/>
+            <a:ext cx="1357231" cy="646331"/>
+          </a:xfrm>
+          <a:prstGeom prst="rect">
+            <a:avLst/>
+          </a:prstGeom>
+          <a:noFill/>
+        </p:spPr>
+        <p:txBody>
+          <a:bodyPr wrap="none" rtlCol="0">
+            <a:spAutoFit/>
+          </a:bodyPr>
+          <a:lstStyle/>
+          <a:p>
+            <a:r>
+              <a:rPr lang="en-US" dirty="0">
+                <a:solidFill>
+                  <a:srgbClr val="C00000"/>
+                </a:solidFill>
+              </a:rPr>
+              <a:t>Rerun which</a:t>
+            </a:r>
+          </a:p>
+          <a:p>
+            <a:r>
+              <a:rPr lang="en-US" dirty="0">
+                <a:solidFill>
+                  <a:srgbClr val="C00000"/>
+                </a:solidFill>
+              </a:rPr>
+              <a:t>models?</a:t>
+            </a:r>
+          </a:p>
+        </p:txBody>
+      </p:sp>
+      <p:sp>
+        <p:nvSpPr>
+          <p:cNvPr id="53" name="TextBox 52">
+            <a:extLst>
+              <a:ext uri="{FF2B5EF4-FFF2-40B4-BE49-F238E27FC236}">
+                <a16:creationId xmlns:a16="http://schemas.microsoft.com/office/drawing/2014/main" id="{262B8E18-22F6-857C-BD94-186DACC0D6F6}"/>
+              </a:ext>
+            </a:extLst>
+          </p:cNvPr>
+          <p:cNvSpPr txBox="1"/>
+          <p:nvPr/>
+        </p:nvSpPr>
+        <p:spPr>
+          <a:xfrm>
+            <a:off x="7811759" y="2270488"/>
+            <a:ext cx="1292854" cy="646331"/>
+          </a:xfrm>
+          <a:prstGeom prst="rect">
+            <a:avLst/>
+          </a:prstGeom>
+          <a:noFill/>
+        </p:spPr>
+        <p:txBody>
+          <a:bodyPr wrap="square" rtlCol="0">
+            <a:spAutoFit/>
+          </a:bodyPr>
+          <a:lstStyle/>
+          <a:p>
+            <a:r>
+              <a:rPr lang="en-US" dirty="0"/>
+              <a:t>Rerun</a:t>
+            </a:r>
+          </a:p>
+          <a:p>
+            <a:r>
+              <a:rPr lang="en-US" dirty="0"/>
+              <a:t>everything?</a:t>
+            </a:r>
+          </a:p>
+        </p:txBody>
+      </p:sp>
+      <p:sp>
+        <p:nvSpPr>
+          <p:cNvPr id="54" name="TextBox 53">
+            <a:extLst>
+              <a:ext uri="{FF2B5EF4-FFF2-40B4-BE49-F238E27FC236}">
+                <a16:creationId xmlns:a16="http://schemas.microsoft.com/office/drawing/2014/main" id="{75C6F126-49C9-A567-23CD-B0CE95EDBC98}"/>
+              </a:ext>
+            </a:extLst>
+          </p:cNvPr>
+          <p:cNvSpPr txBox="1"/>
+          <p:nvPr/>
+        </p:nvSpPr>
+        <p:spPr>
+          <a:xfrm>
+            <a:off x="10193054" y="2180678"/>
+            <a:ext cx="1292854" cy="646331"/>
+          </a:xfrm>
+          <a:prstGeom prst="rect">
+            <a:avLst/>
+          </a:prstGeom>
+          <a:noFill/>
+        </p:spPr>
+        <p:txBody>
+          <a:bodyPr wrap="none" rtlCol="0">
+            <a:spAutoFit/>
+          </a:bodyPr>
+          <a:lstStyle/>
+          <a:p>
+            <a:r>
+              <a:rPr lang="en-US" dirty="0"/>
+              <a:t>Rerun</a:t>
+            </a:r>
+          </a:p>
+          <a:p>
+            <a:r>
+              <a:rPr lang="en-US" dirty="0"/>
+              <a:t>everything?</a:t>
+            </a:r>
+          </a:p>
+        </p:txBody>
+      </p:sp>
+      <p:sp>
+        <p:nvSpPr>
+          <p:cNvPr id="55" name="TextBox 54">
+            <a:extLst>
+              <a:ext uri="{FF2B5EF4-FFF2-40B4-BE49-F238E27FC236}">
+                <a16:creationId xmlns:a16="http://schemas.microsoft.com/office/drawing/2014/main" id="{2DD0B1D8-05E4-7072-993A-E0AFFDC8C39E}"/>
+              </a:ext>
+            </a:extLst>
+          </p:cNvPr>
+          <p:cNvSpPr txBox="1"/>
+          <p:nvPr/>
+        </p:nvSpPr>
+        <p:spPr>
+          <a:xfrm>
+            <a:off x="528964" y="2265732"/>
+            <a:ext cx="1188467" cy="646331"/>
+          </a:xfrm>
+          <a:prstGeom prst="rect">
+            <a:avLst/>
+          </a:prstGeom>
+          <a:noFill/>
+        </p:spPr>
+        <p:txBody>
+          <a:bodyPr wrap="none" rtlCol="0">
+            <a:spAutoFit/>
+          </a:bodyPr>
+          <a:lstStyle/>
+          <a:p>
+            <a:r>
+              <a:rPr lang="en-US" dirty="0"/>
+              <a:t>Skip to</a:t>
+            </a:r>
+          </a:p>
+          <a:p>
+            <a:r>
+              <a:rPr lang="en-US" dirty="0"/>
+              <a:t>save time?</a:t>
+            </a:r>
+          </a:p>
+        </p:txBody>
+      </p:sp>
+      <p:sp>
+        <p:nvSpPr>
+          <p:cNvPr id="56" name="TextBox 55">
+            <a:extLst>
+              <a:ext uri="{FF2B5EF4-FFF2-40B4-BE49-F238E27FC236}">
+                <a16:creationId xmlns:a16="http://schemas.microsoft.com/office/drawing/2014/main" id="{F1DEA239-4427-59E2-DD31-E1AA4169D4DA}"/>
+              </a:ext>
+            </a:extLst>
+          </p:cNvPr>
+          <p:cNvSpPr txBox="1"/>
+          <p:nvPr/>
+        </p:nvSpPr>
+        <p:spPr>
+          <a:xfrm>
+            <a:off x="2665817" y="2300016"/>
+            <a:ext cx="1188467" cy="646331"/>
+          </a:xfrm>
+          <a:prstGeom prst="rect">
+            <a:avLst/>
+          </a:prstGeom>
+          <a:noFill/>
+        </p:spPr>
+        <p:txBody>
+          <a:bodyPr wrap="none" rtlCol="0">
+            <a:spAutoFit/>
+          </a:bodyPr>
+          <a:lstStyle/>
+          <a:p>
+            <a:r>
+              <a:rPr lang="en-US" dirty="0"/>
+              <a:t>Skip to</a:t>
+            </a:r>
+          </a:p>
+          <a:p>
+            <a:r>
+              <a:rPr lang="en-US" dirty="0"/>
+              <a:t>save time?</a:t>
+            </a:r>
+          </a:p>
+        </p:txBody>
+      </p:sp>
+      <p:pic>
+        <p:nvPicPr>
+          <p:cNvPr id="62" name="Picture 61">
+            <a:extLst>
+              <a:ext uri="{FF2B5EF4-FFF2-40B4-BE49-F238E27FC236}">
+                <a16:creationId xmlns:a16="http://schemas.microsoft.com/office/drawing/2014/main" id="{88904784-305E-95AB-E5BF-82E244C26AE4}"/>
+              </a:ext>
+            </a:extLst>
+          </p:cNvPr>
+          <p:cNvPicPr>
+            <a:picLocks noChangeAspect="1"/>
+          </p:cNvPicPr>
+          <p:nvPr/>
+        </p:nvPicPr>
+        <p:blipFill>
+          <a:blip r:embed="rId3"/>
+          <a:stretch>
+            <a:fillRect/>
+          </a:stretch>
+        </p:blipFill>
+        <p:spPr>
+          <a:xfrm>
+            <a:off x="1709976" y="5282"/>
+            <a:ext cx="1664239" cy="1720974"/>
+          </a:xfrm>
+          <a:prstGeom prst="rect">
+            <a:avLst/>
+          </a:prstGeom>
+        </p:spPr>
+      </p:pic>
+      <p:sp>
+        <p:nvSpPr>
+          <p:cNvPr id="66" name="TextBox 65">
+            <a:extLst>
+              <a:ext uri="{FF2B5EF4-FFF2-40B4-BE49-F238E27FC236}">
+                <a16:creationId xmlns:a16="http://schemas.microsoft.com/office/drawing/2014/main" id="{B05699CA-FCC6-EB9D-6D72-E963FD8E5F3B}"/>
+              </a:ext>
+            </a:extLst>
+          </p:cNvPr>
+          <p:cNvSpPr txBox="1"/>
+          <p:nvPr/>
+        </p:nvSpPr>
+        <p:spPr>
+          <a:xfrm>
+            <a:off x="2022281" y="319876"/>
+            <a:ext cx="1249213" cy="646331"/>
+          </a:xfrm>
+          <a:prstGeom prst="rect">
+            <a:avLst/>
+          </a:prstGeom>
+          <a:noFill/>
+        </p:spPr>
+        <p:txBody>
+          <a:bodyPr wrap="square" rtlCol="0">
+            <a:spAutoFit/>
+          </a:bodyPr>
+          <a:lstStyle/>
+          <a:p>
+            <a:r>
+              <a:rPr lang="en-US" dirty="0"/>
+              <a:t>What do I rerun?</a:t>
+            </a:r>
+          </a:p>
+        </p:txBody>
+      </p:sp>
+      <p:pic>
+        <p:nvPicPr>
+          <p:cNvPr id="67" name="Picture 66">
+            <a:extLst>
+              <a:ext uri="{FF2B5EF4-FFF2-40B4-BE49-F238E27FC236}">
+                <a16:creationId xmlns:a16="http://schemas.microsoft.com/office/drawing/2014/main" id="{BABB9E85-079D-EA7D-5285-4FD5707D8FB7}"/>
+              </a:ext>
+            </a:extLst>
+          </p:cNvPr>
+          <p:cNvPicPr>
+            <a:picLocks noChangeAspect="1"/>
+          </p:cNvPicPr>
+          <p:nvPr/>
+        </p:nvPicPr>
+        <p:blipFill>
+          <a:blip r:embed="rId3"/>
+          <a:stretch>
+            <a:fillRect/>
+          </a:stretch>
+        </p:blipFill>
+        <p:spPr>
+          <a:xfrm flipH="1">
+            <a:off x="5962145" y="-2036"/>
+            <a:ext cx="1980898" cy="1866756"/>
+          </a:xfrm>
+          <a:prstGeom prst="rect">
+            <a:avLst/>
+          </a:prstGeom>
+        </p:spPr>
+      </p:pic>
+      <p:sp>
+        <p:nvSpPr>
+          <p:cNvPr id="68" name="TextBox 67">
+            <a:extLst>
+              <a:ext uri="{FF2B5EF4-FFF2-40B4-BE49-F238E27FC236}">
+                <a16:creationId xmlns:a16="http://schemas.microsoft.com/office/drawing/2014/main" id="{5175716A-4838-840C-AE85-0C3D4720E5D5}"/>
+              </a:ext>
+            </a:extLst>
+          </p:cNvPr>
+          <p:cNvSpPr txBox="1"/>
+          <p:nvPr/>
+        </p:nvSpPr>
+        <p:spPr>
+          <a:xfrm>
+            <a:off x="6144202" y="321883"/>
+            <a:ext cx="1805215" cy="646331"/>
+          </a:xfrm>
+          <a:prstGeom prst="rect">
+            <a:avLst/>
+          </a:prstGeom>
+          <a:noFill/>
+        </p:spPr>
+        <p:txBody>
+          <a:bodyPr wrap="square" rtlCol="0">
+            <a:spAutoFit/>
+          </a:bodyPr>
+          <a:lstStyle/>
+          <a:p>
+            <a:r>
+              <a:rPr lang="en-US" dirty="0"/>
+              <a:t>Will the output</a:t>
+            </a:r>
+          </a:p>
+          <a:p>
+            <a:r>
+              <a:rPr lang="en-US" dirty="0"/>
+              <a:t>be reproducible?</a:t>
+            </a:r>
+          </a:p>
+        </p:txBody>
+      </p:sp>
+      <p:sp>
+        <p:nvSpPr>
+          <p:cNvPr id="69" name="TextBox 68">
+            <a:extLst>
+              <a:ext uri="{FF2B5EF4-FFF2-40B4-BE49-F238E27FC236}">
+                <a16:creationId xmlns:a16="http://schemas.microsoft.com/office/drawing/2014/main" id="{468B9DA0-0C42-A26E-DA3A-8D79CD50F72B}"/>
+              </a:ext>
+            </a:extLst>
+          </p:cNvPr>
+          <p:cNvSpPr txBox="1"/>
+          <p:nvPr/>
+        </p:nvSpPr>
+        <p:spPr>
+          <a:xfrm>
+            <a:off x="9244975" y="6395725"/>
+            <a:ext cx="2947025" cy="461665"/>
+          </a:xfrm>
+          <a:prstGeom prst="rect">
+            <a:avLst/>
+          </a:prstGeom>
+          <a:noFill/>
+        </p:spPr>
+        <p:txBody>
+          <a:bodyPr wrap="none" rtlCol="0">
+            <a:spAutoFit/>
+          </a:bodyPr>
+          <a:lstStyle/>
+          <a:p>
+            <a:r>
+              <a:rPr lang="en-US" sz="1200" dirty="0">
+                <a:hlinkClick r:id="rId4"/>
+              </a:rPr>
+              <a:t>https://openclipart.org/</a:t>
+            </a:r>
+            <a:endParaRPr lang="en-US" sz="1200" dirty="0"/>
+          </a:p>
+          <a:p>
+            <a:r>
+              <a:rPr lang="en-US" sz="1200" dirty="0">
+                <a:hlinkClick r:id="rId5"/>
+              </a:rPr>
+              <a:t>https://</a:t>
+            </a:r>
+            <a:r>
+              <a:rPr lang="en-US" sz="1200" dirty="0" err="1">
+                <a:hlinkClick r:id="rId5"/>
+              </a:rPr>
+              <a:t>unsplash.com</a:t>
+            </a:r>
+            <a:r>
+              <a:rPr lang="en-US" sz="1200" dirty="0">
+                <a:hlinkClick r:id="rId5"/>
+              </a:rPr>
+              <a:t>/photos/_sh9vkVbVgo </a:t>
+            </a:r>
+            <a:endParaRPr lang="en-US" sz="1200" dirty="0"/>
+          </a:p>
+        </p:txBody>
+      </p:sp>
+    </p:spTree>
+    <p:extLst>
+      <p:ext uri="{BB962C8B-B14F-4D97-AF65-F5344CB8AC3E}">
+        <p14:creationId xmlns:p14="http://schemas.microsoft.com/office/powerpoint/2010/main" val="639999626"/>
+      </p:ext>
+    </p:extLst>
+  </p:cSld>
+  <p:clrMapOvr>
+    <a:masterClrMapping/>
+  </p:clrMapOvr>
+</p:sld>
+</file>
+
+<file path=ppt/slides/slide11.xml><?xml version="1.0" encoding="utf-8"?>
+<p:sld xmlns:a="http://schemas.openxmlformats.org/drawingml/2006/main" xmlns:r="http://schemas.openxmlformats.org/officeDocument/2006/relationships" xmlns:p="http://schemas.openxmlformats.org/presentationml/2006/main">
+  <p:cSld>
+    <p:spTree>
+      <p:nvGrpSpPr>
+        <p:cNvPr id="1" name=""/>
+        <p:cNvGrpSpPr/>
+        <p:nvPr/>
+      </p:nvGrpSpPr>
+      <p:grpSpPr>
+        <a:xfrm>
+          <a:off x="0" y="0"/>
+          <a:ext cx="0" cy="0"/>
+          <a:chOff x="0" y="0"/>
+          <a:chExt cx="0" cy="0"/>
+        </a:xfrm>
+      </p:grpSpPr>
+      <p:pic>
+        <p:nvPicPr>
           <p:cNvPr id="5" name="Picture 4" descr="A picture containing graphical user interface&#10;&#10;Description automatically generated">
             <a:extLst>
               <a:ext uri="{FF2B5EF4-FFF2-40B4-BE49-F238E27FC236}">
@@ -6488,7 +8748,7 @@
         </p:nvSpPr>
         <p:spPr>
           <a:xfrm>
-            <a:off x="5433092" y="386602"/>
+            <a:off x="5187351" y="3286623"/>
             <a:ext cx="987973" cy="1090449"/>
           </a:xfrm>
           <a:prstGeom prst="actionButtonDocument">
@@ -6546,7 +8806,7 @@
         </p:nvSpPr>
         <p:spPr>
           <a:xfrm>
-            <a:off x="7775086" y="374624"/>
+            <a:off x="7768069" y="3256149"/>
             <a:ext cx="987973" cy="1090449"/>
           </a:xfrm>
           <a:prstGeom prst="actionButtonDocument">
@@ -6604,7 +8864,7 @@
         </p:nvSpPr>
         <p:spPr>
           <a:xfrm>
-            <a:off x="10121521" y="374624"/>
+            <a:off x="10307639" y="3218649"/>
             <a:ext cx="987973" cy="1090449"/>
           </a:xfrm>
           <a:prstGeom prst="actionButtonDocument">
@@ -6661,7 +8921,7 @@
         </p:nvSpPr>
         <p:spPr>
           <a:xfrm>
-            <a:off x="2916790" y="1516889"/>
+            <a:off x="2622760" y="4426461"/>
             <a:ext cx="1318823" cy="369332"/>
           </a:xfrm>
           <a:prstGeom prst="rect">
@@ -6696,8 +8956,43 @@
         </p:nvSpPr>
         <p:spPr>
           <a:xfrm>
-            <a:off x="421693" y="1516889"/>
+            <a:off x="43467" y="4427239"/>
             <a:ext cx="1616148" cy="369332"/>
+          </a:xfrm>
+          <a:prstGeom prst="rect">
+            <a:avLst/>
+          </a:prstGeom>
+          <a:noFill/>
+        </p:spPr>
+        <p:txBody>
+          <a:bodyPr wrap="square" rtlCol="0">
+            <a:spAutoFit/>
+          </a:bodyPr>
+          <a:lstStyle/>
+          <a:p>
+            <a:r>
+              <a:rPr lang="en-US" dirty="0"/>
+              <a:t>01-import.Rmd</a:t>
+            </a:r>
+          </a:p>
+        </p:txBody>
+      </p:sp>
+      <p:sp>
+        <p:nvSpPr>
+          <p:cNvPr id="15" name="TextBox 14">
+            <a:extLst>
+              <a:ext uri="{FF2B5EF4-FFF2-40B4-BE49-F238E27FC236}">
+                <a16:creationId xmlns:a16="http://schemas.microsoft.com/office/drawing/2014/main" id="{A2E9674F-3B03-DE46-97CA-9B7427C7A466}"/>
+              </a:ext>
+            </a:extLst>
+          </p:cNvPr>
+          <p:cNvSpPr txBox="1"/>
+          <p:nvPr/>
+        </p:nvSpPr>
+        <p:spPr>
+          <a:xfrm>
+            <a:off x="4843167" y="4391569"/>
+            <a:ext cx="1664238" cy="369332"/>
           </a:xfrm>
           <a:prstGeom prst="rect">
             <a:avLst/>
@@ -6712,17 +9007,17 @@
           <a:p>
             <a:r>
               <a:rPr lang="en-US" dirty="0"/>
-              <a:t>01-import.Rmd</a:t>
-            </a:r>
-          </a:p>
-        </p:txBody>
-      </p:sp>
-      <p:sp>
-        <p:nvSpPr>
-          <p:cNvPr id="15" name="TextBox 14">
-            <a:extLst>
-              <a:ext uri="{FF2B5EF4-FFF2-40B4-BE49-F238E27FC236}">
-                <a16:creationId xmlns:a16="http://schemas.microsoft.com/office/drawing/2014/main" id="{A2E9674F-3B03-DE46-97CA-9B7427C7A466}"/>
+              <a:t>03-models.Rmd</a:t>
+            </a:r>
+          </a:p>
+        </p:txBody>
+      </p:sp>
+      <p:sp>
+        <p:nvSpPr>
+          <p:cNvPr id="18" name="TextBox 17">
+            <a:extLst>
+              <a:ext uri="{FF2B5EF4-FFF2-40B4-BE49-F238E27FC236}">
+                <a16:creationId xmlns:a16="http://schemas.microsoft.com/office/drawing/2014/main" id="{15BA7C0C-5DE3-324D-987E-CCBD86F2171A}"/>
               </a:ext>
             </a:extLst>
           </p:cNvPr>
@@ -6731,8 +9026,8 @@
         </p:nvSpPr>
         <p:spPr>
           <a:xfrm>
-            <a:off x="5055155" y="1516889"/>
-            <a:ext cx="1664238" cy="369332"/>
+            <a:off x="7408989" y="4375903"/>
+            <a:ext cx="1762790" cy="369332"/>
           </a:xfrm>
           <a:prstGeom prst="rect">
             <a:avLst/>
@@ -6747,17 +9042,17 @@
           <a:p>
             <a:r>
               <a:rPr lang="en-US" dirty="0"/>
-              <a:t>03-models.Rmd</a:t>
-            </a:r>
-          </a:p>
-        </p:txBody>
-      </p:sp>
-      <p:sp>
-        <p:nvSpPr>
-          <p:cNvPr id="18" name="TextBox 17">
-            <a:extLst>
-              <a:ext uri="{FF2B5EF4-FFF2-40B4-BE49-F238E27FC236}">
-                <a16:creationId xmlns:a16="http://schemas.microsoft.com/office/drawing/2014/main" id="{15BA7C0C-5DE3-324D-987E-CCBD86F2171A}"/>
+              <a:t>04-visualize.Rmd</a:t>
+            </a:r>
+          </a:p>
+        </p:txBody>
+      </p:sp>
+      <p:sp>
+        <p:nvSpPr>
+          <p:cNvPr id="19" name="TextBox 18">
+            <a:extLst>
+              <a:ext uri="{FF2B5EF4-FFF2-40B4-BE49-F238E27FC236}">
+                <a16:creationId xmlns:a16="http://schemas.microsoft.com/office/drawing/2014/main" id="{0D3529FA-493C-D340-917E-D2BE38F4E151}"/>
               </a:ext>
             </a:extLst>
           </p:cNvPr>
@@ -6766,8 +9061,8 @@
         </p:nvSpPr>
         <p:spPr>
           <a:xfrm>
-            <a:off x="7387677" y="1516889"/>
-            <a:ext cx="1762790" cy="369332"/>
+            <a:off x="9673976" y="4346598"/>
+            <a:ext cx="2255297" cy="369332"/>
           </a:xfrm>
           <a:prstGeom prst="rect">
             <a:avLst/>
@@ -6782,259 +9077,8 @@
           <a:p>
             <a:r>
               <a:rPr lang="en-US" dirty="0"/>
-              <a:t>04-visualize.Rmd</a:t>
-            </a:r>
-          </a:p>
-        </p:txBody>
-      </p:sp>
-      <p:sp>
-        <p:nvSpPr>
-          <p:cNvPr id="19" name="TextBox 18">
-            <a:extLst>
-              <a:ext uri="{FF2B5EF4-FFF2-40B4-BE49-F238E27FC236}">
-                <a16:creationId xmlns:a16="http://schemas.microsoft.com/office/drawing/2014/main" id="{0D3529FA-493C-D340-917E-D2BE38F4E151}"/>
-              </a:ext>
-            </a:extLst>
-          </p:cNvPr>
-          <p:cNvSpPr txBox="1"/>
-          <p:nvPr/>
-        </p:nvSpPr>
-        <p:spPr>
-          <a:xfrm>
-            <a:off x="9487858" y="1548421"/>
-            <a:ext cx="2255297" cy="369332"/>
-          </a:xfrm>
-          <a:prstGeom prst="rect">
-            <a:avLst/>
-          </a:prstGeom>
-          <a:noFill/>
-        </p:spPr>
-        <p:txBody>
-          <a:bodyPr wrap="none" rtlCol="0">
-            <a:spAutoFit/>
-          </a:bodyPr>
-          <a:lstStyle/>
-          <a:p>
-            <a:r>
-              <a:rPr lang="en-US" dirty="0"/>
               <a:t>05-communicate.Rmd</a:t>
             </a:r>
-          </a:p>
-        </p:txBody>
-      </p:sp>
-      <p:sp>
-        <p:nvSpPr>
-          <p:cNvPr id="20" name="Right Arrow 19">
-            <a:extLst>
-              <a:ext uri="{FF2B5EF4-FFF2-40B4-BE49-F238E27FC236}">
-                <a16:creationId xmlns:a16="http://schemas.microsoft.com/office/drawing/2014/main" id="{519AB274-0280-634F-90B3-89BCB6CD12EA}"/>
-              </a:ext>
-            </a:extLst>
-          </p:cNvPr>
-          <p:cNvSpPr/>
-          <p:nvPr/>
-        </p:nvSpPr>
-        <p:spPr>
-          <a:xfrm>
-            <a:off x="4431514" y="721619"/>
-            <a:ext cx="644694" cy="420414"/>
-          </a:xfrm>
-          <a:prstGeom prst="rightArrow">
-            <a:avLst/>
-          </a:prstGeom>
-          <a:solidFill>
-            <a:schemeClr val="bg2">
-              <a:lumMod val="75000"/>
-            </a:schemeClr>
-          </a:solidFill>
-          <a:ln>
-            <a:noFill/>
-          </a:ln>
-        </p:spPr>
-        <p:style>
-          <a:lnRef idx="2">
-            <a:schemeClr val="accent1">
-              <a:shade val="50000"/>
-            </a:schemeClr>
-          </a:lnRef>
-          <a:fillRef idx="1">
-            <a:schemeClr val="accent1"/>
-          </a:fillRef>
-          <a:effectRef idx="0">
-            <a:schemeClr val="accent1"/>
-          </a:effectRef>
-          <a:fontRef idx="minor">
-            <a:schemeClr val="lt1"/>
-          </a:fontRef>
-        </p:style>
-        <p:txBody>
-          <a:bodyPr rtlCol="0" anchor="ctr"/>
-          <a:lstStyle/>
-          <a:p>
-            <a:pPr algn="ctr"/>
-            <a:endParaRPr lang="en-US"/>
-          </a:p>
-        </p:txBody>
-      </p:sp>
-      <p:sp>
-        <p:nvSpPr>
-          <p:cNvPr id="21" name="Right Arrow 20">
-            <a:extLst>
-              <a:ext uri="{FF2B5EF4-FFF2-40B4-BE49-F238E27FC236}">
-                <a16:creationId xmlns:a16="http://schemas.microsoft.com/office/drawing/2014/main" id="{A4F0C651-E7B4-0D48-83A4-11637097C025}"/>
-              </a:ext>
-            </a:extLst>
-          </p:cNvPr>
-          <p:cNvSpPr/>
-          <p:nvPr/>
-        </p:nvSpPr>
-        <p:spPr>
-          <a:xfrm>
-            <a:off x="6773508" y="709640"/>
-            <a:ext cx="644694" cy="420414"/>
-          </a:xfrm>
-          <a:prstGeom prst="rightArrow">
-            <a:avLst/>
-          </a:prstGeom>
-          <a:solidFill>
-            <a:schemeClr val="bg2">
-              <a:lumMod val="75000"/>
-            </a:schemeClr>
-          </a:solidFill>
-          <a:ln>
-            <a:noFill/>
-          </a:ln>
-        </p:spPr>
-        <p:style>
-          <a:lnRef idx="2">
-            <a:schemeClr val="accent1">
-              <a:shade val="50000"/>
-            </a:schemeClr>
-          </a:lnRef>
-          <a:fillRef idx="1">
-            <a:schemeClr val="accent1"/>
-          </a:fillRef>
-          <a:effectRef idx="0">
-            <a:schemeClr val="accent1"/>
-          </a:effectRef>
-          <a:fontRef idx="minor">
-            <a:schemeClr val="lt1"/>
-          </a:fontRef>
-        </p:style>
-        <p:txBody>
-          <a:bodyPr rtlCol="0" anchor="ctr"/>
-          <a:lstStyle/>
-          <a:p>
-            <a:pPr algn="ctr"/>
-            <a:endParaRPr lang="en-US"/>
-          </a:p>
-        </p:txBody>
-      </p:sp>
-      <p:sp>
-        <p:nvSpPr>
-          <p:cNvPr id="22" name="Right Arrow 21">
-            <a:extLst>
-              <a:ext uri="{FF2B5EF4-FFF2-40B4-BE49-F238E27FC236}">
-                <a16:creationId xmlns:a16="http://schemas.microsoft.com/office/drawing/2014/main" id="{723194B3-7105-934A-92C9-C5B8AAECF8DD}"/>
-              </a:ext>
-            </a:extLst>
-          </p:cNvPr>
-          <p:cNvSpPr/>
-          <p:nvPr/>
-        </p:nvSpPr>
-        <p:spPr>
-          <a:xfrm>
-            <a:off x="9165511" y="709640"/>
-            <a:ext cx="644694" cy="420414"/>
-          </a:xfrm>
-          <a:prstGeom prst="rightArrow">
-            <a:avLst/>
-          </a:prstGeom>
-          <a:solidFill>
-            <a:schemeClr val="bg2">
-              <a:lumMod val="75000"/>
-            </a:schemeClr>
-          </a:solidFill>
-          <a:ln>
-            <a:noFill/>
-          </a:ln>
-        </p:spPr>
-        <p:style>
-          <a:lnRef idx="2">
-            <a:schemeClr val="accent1">
-              <a:shade val="50000"/>
-            </a:schemeClr>
-          </a:lnRef>
-          <a:fillRef idx="1">
-            <a:schemeClr val="accent1"/>
-          </a:fillRef>
-          <a:effectRef idx="0">
-            <a:schemeClr val="accent1"/>
-          </a:effectRef>
-          <a:fontRef idx="minor">
-            <a:schemeClr val="lt1"/>
-          </a:fontRef>
-        </p:style>
-        <p:txBody>
-          <a:bodyPr rtlCol="0" anchor="ctr"/>
-          <a:lstStyle/>
-          <a:p>
-            <a:pPr algn="ctr"/>
-            <a:endParaRPr lang="en-US"/>
-          </a:p>
-        </p:txBody>
-      </p:sp>
-      <p:sp>
-        <p:nvSpPr>
-          <p:cNvPr id="23" name="Right Arrow 22">
-            <a:extLst>
-              <a:ext uri="{FF2B5EF4-FFF2-40B4-BE49-F238E27FC236}">
-                <a16:creationId xmlns:a16="http://schemas.microsoft.com/office/drawing/2014/main" id="{A1773BE5-6031-A44B-B46F-DCA2CE78B843}"/>
-              </a:ext>
-            </a:extLst>
-          </p:cNvPr>
-          <p:cNvSpPr/>
-          <p:nvPr/>
-        </p:nvSpPr>
-        <p:spPr>
-          <a:xfrm>
-            <a:off x="2120768" y="721619"/>
-            <a:ext cx="644694" cy="420414"/>
-          </a:xfrm>
-          <a:prstGeom prst="rightArrow">
-            <a:avLst/>
-          </a:prstGeom>
-          <a:solidFill>
-            <a:schemeClr val="bg2">
-              <a:lumMod val="75000"/>
-            </a:schemeClr>
-          </a:solidFill>
-          <a:ln>
-            <a:noFill/>
-          </a:ln>
-        </p:spPr>
-        <p:style>
-          <a:lnRef idx="2">
-            <a:schemeClr val="accent1">
-              <a:shade val="50000"/>
-            </a:schemeClr>
-          </a:lnRef>
-          <a:fillRef idx="1">
-            <a:schemeClr val="accent1"/>
-          </a:fillRef>
-          <a:effectRef idx="0">
-            <a:schemeClr val="accent1"/>
-          </a:effectRef>
-          <a:fontRef idx="minor">
-            <a:schemeClr val="lt1"/>
-          </a:fontRef>
-        </p:style>
-        <p:txBody>
-          <a:bodyPr rtlCol="0" anchor="ctr"/>
-          <a:lstStyle/>
-          <a:p>
-            <a:pPr algn="ctr"/>
-            <a:endParaRPr lang="en-US"/>
           </a:p>
         </p:txBody>
       </p:sp>
@@ -7053,7 +9097,7 @@
         </p:nvSpPr>
         <p:spPr>
           <a:xfrm>
-            <a:off x="3073052" y="294213"/>
+            <a:off x="2777508" y="3286622"/>
             <a:ext cx="987973" cy="1090449"/>
           </a:xfrm>
           <a:prstGeom prst="actionButtonDocument">
@@ -7111,7 +9155,7 @@
         </p:nvSpPr>
         <p:spPr>
           <a:xfrm>
-            <a:off x="794662" y="309840"/>
+            <a:off x="398014" y="3274737"/>
             <a:ext cx="987973" cy="1090449"/>
           </a:xfrm>
           <a:prstGeom prst="actionButtonDocument">
@@ -7156,10 +9200,10 @@
       </p:sp>
       <p:sp>
         <p:nvSpPr>
-          <p:cNvPr id="65" name="TextBox 64">
-            <a:extLst>
-              <a:ext uri="{FF2B5EF4-FFF2-40B4-BE49-F238E27FC236}">
-                <a16:creationId xmlns:a16="http://schemas.microsoft.com/office/drawing/2014/main" id="{9A53DF5E-981D-DF4B-831D-7261B340A292}"/>
+          <p:cNvPr id="69" name="TextBox 68">
+            <a:extLst>
+              <a:ext uri="{FF2B5EF4-FFF2-40B4-BE49-F238E27FC236}">
+                <a16:creationId xmlns:a16="http://schemas.microsoft.com/office/drawing/2014/main" id="{468B9DA0-0C42-A26E-DA3A-8D79CD50F72B}"/>
               </a:ext>
             </a:extLst>
           </p:cNvPr>
@@ -7168,8 +9212,8 @@
         </p:nvSpPr>
         <p:spPr>
           <a:xfrm>
-            <a:off x="10121521" y="2001101"/>
-            <a:ext cx="1683089" cy="276999"/>
+            <a:off x="9244975" y="6395725"/>
+            <a:ext cx="2947025" cy="461665"/>
           </a:xfrm>
           <a:prstGeom prst="rect">
             <a:avLst/>
@@ -7190,12 +9234,33 @@
             </a:r>
             <a:endParaRPr lang="en-US" sz="1200" dirty="0"/>
           </a:p>
+          <a:p>
+            <a:r>
+              <a:rPr lang="en-US" sz="1200" dirty="0">
+                <a:hlinkClick r:id="rId3"/>
+              </a:rPr>
+              <a:t>https://</a:t>
+            </a:r>
+            <a:r>
+              <a:rPr lang="en-US" sz="1200" dirty="0" err="1">
+                <a:hlinkClick r:id="rId3"/>
+              </a:rPr>
+              <a:t>unsplash.com</a:t>
+            </a:r>
+            <a:r>
+              <a:rPr lang="en-US" sz="1200" dirty="0">
+                <a:hlinkClick r:id="rId3"/>
+              </a:rPr>
+              <a:t>/photos/_sh9vkVbVgo </a:t>
+            </a:r>
+            <a:endParaRPr lang="en-US" sz="1200" dirty="0"/>
+          </a:p>
         </p:txBody>
       </p:sp>
     </p:spTree>
     <p:extLst>
       <p:ext uri="{BB962C8B-B14F-4D97-AF65-F5344CB8AC3E}">
-        <p14:creationId xmlns:p14="http://schemas.microsoft.com/office/powerpoint/2010/main" val="2599836842"/>
+        <p14:creationId xmlns:p14="http://schemas.microsoft.com/office/powerpoint/2010/main" val="1262438463"/>
       </p:ext>
     </p:extLst>
   </p:cSld>
@@ -7237,7 +9302,7 @@
         </p:nvSpPr>
         <p:spPr>
           <a:xfrm>
-            <a:off x="5433092" y="386602"/>
+            <a:off x="5187351" y="3286623"/>
             <a:ext cx="987973" cy="1090449"/>
           </a:xfrm>
           <a:prstGeom prst="actionButtonDocument">
@@ -7295,7 +9360,7 @@
         </p:nvSpPr>
         <p:spPr>
           <a:xfrm>
-            <a:off x="7775086" y="374624"/>
+            <a:off x="7768069" y="3256149"/>
             <a:ext cx="987973" cy="1090449"/>
           </a:xfrm>
           <a:prstGeom prst="actionButtonDocument">
@@ -7353,7 +9418,7 @@
         </p:nvSpPr>
         <p:spPr>
           <a:xfrm>
-            <a:off x="10121521" y="374624"/>
+            <a:off x="10307639" y="3218649"/>
             <a:ext cx="987973" cy="1090449"/>
           </a:xfrm>
           <a:prstGeom prst="actionButtonDocument">
@@ -7410,7 +9475,7 @@
         </p:nvSpPr>
         <p:spPr>
           <a:xfrm>
-            <a:off x="2916790" y="1516889"/>
+            <a:off x="2622760" y="4426461"/>
             <a:ext cx="1318823" cy="369332"/>
           </a:xfrm>
           <a:prstGeom prst="rect">
@@ -7445,7 +9510,7 @@
         </p:nvSpPr>
         <p:spPr>
           <a:xfrm>
-            <a:off x="421693" y="1516889"/>
+            <a:off x="43467" y="4427239"/>
             <a:ext cx="1616148" cy="369332"/>
           </a:xfrm>
           <a:prstGeom prst="rect">
@@ -7480,7 +9545,7 @@
         </p:nvSpPr>
         <p:spPr>
           <a:xfrm>
-            <a:off x="5055155" y="1516889"/>
+            <a:off x="4843167" y="4391569"/>
             <a:ext cx="1664238" cy="369332"/>
           </a:xfrm>
           <a:prstGeom prst="rect">
@@ -7515,7 +9580,7 @@
         </p:nvSpPr>
         <p:spPr>
           <a:xfrm>
-            <a:off x="7387677" y="1516889"/>
+            <a:off x="7408989" y="4375903"/>
             <a:ext cx="1762790" cy="369332"/>
           </a:xfrm>
           <a:prstGeom prst="rect">
@@ -7550,7 +9615,7 @@
         </p:nvSpPr>
         <p:spPr>
           <a:xfrm>
-            <a:off x="9487858" y="1548421"/>
+            <a:off x="9673976" y="4346598"/>
             <a:ext cx="2255297" cy="369332"/>
           </a:xfrm>
           <a:prstGeom prst="rect">
@@ -7584,9 +9649,9 @@
           <p:nvPr/>
         </p:nvSpPr>
         <p:spPr>
-          <a:xfrm rot="5655859">
-            <a:off x="2549034" y="2730213"/>
-            <a:ext cx="1933581" cy="420414"/>
+          <a:xfrm rot="3061977">
+            <a:off x="2864855" y="4988972"/>
+            <a:ext cx="743903" cy="364034"/>
           </a:xfrm>
           <a:prstGeom prst="rightArrow">
             <a:avLst/>
@@ -7643,9 +9708,9 @@
           <p:nvPr/>
         </p:nvSpPr>
         <p:spPr>
-          <a:xfrm rot="17248110">
-            <a:off x="7563052" y="2216584"/>
-            <a:ext cx="892466" cy="420414"/>
+          <a:xfrm rot="15522002">
+            <a:off x="8398123" y="4645859"/>
+            <a:ext cx="225532" cy="420414"/>
           </a:xfrm>
           <a:prstGeom prst="rightArrow">
             <a:avLst/>
@@ -7703,7 +9768,7 @@
         </p:nvSpPr>
         <p:spPr>
           <a:xfrm rot="3726193">
-            <a:off x="1521611" y="2027148"/>
+            <a:off x="923731" y="4918865"/>
             <a:ext cx="644694" cy="420414"/>
           </a:xfrm>
           <a:prstGeom prst="rightArrow">
@@ -7758,7 +9823,7 @@
         </p:nvSpPr>
         <p:spPr>
           <a:xfrm>
-            <a:off x="3073052" y="294213"/>
+            <a:off x="2777508" y="3286622"/>
             <a:ext cx="987973" cy="1090449"/>
           </a:xfrm>
           <a:prstGeom prst="actionButtonDocument">
@@ -7816,7 +9881,7 @@
         </p:nvSpPr>
         <p:spPr>
           <a:xfrm>
-            <a:off x="794662" y="309840"/>
+            <a:off x="398014" y="3274737"/>
             <a:ext cx="987973" cy="1090449"/>
           </a:xfrm>
           <a:prstGeom prst="actionButtonDocument">
@@ -7861,44 +9926,6 @@
       </p:sp>
       <p:sp>
         <p:nvSpPr>
-          <p:cNvPr id="65" name="TextBox 64">
-            <a:extLst>
-              <a:ext uri="{FF2B5EF4-FFF2-40B4-BE49-F238E27FC236}">
-                <a16:creationId xmlns:a16="http://schemas.microsoft.com/office/drawing/2014/main" id="{9A53DF5E-981D-DF4B-831D-7261B340A292}"/>
-              </a:ext>
-            </a:extLst>
-          </p:cNvPr>
-          <p:cNvSpPr txBox="1"/>
-          <p:nvPr/>
-        </p:nvSpPr>
-        <p:spPr>
-          <a:xfrm>
-            <a:off x="9279976" y="5536818"/>
-            <a:ext cx="1683089" cy="276999"/>
-          </a:xfrm>
-          <a:prstGeom prst="rect">
-            <a:avLst/>
-          </a:prstGeom>
-          <a:noFill/>
-        </p:spPr>
-        <p:txBody>
-          <a:bodyPr wrap="none" rtlCol="0">
-            <a:spAutoFit/>
-          </a:bodyPr>
-          <a:lstStyle/>
-          <a:p>
-            <a:r>
-              <a:rPr lang="en-US" sz="1200" dirty="0">
-                <a:hlinkClick r:id="rId2"/>
-              </a:rPr>
-              <a:t>https://openclipart.org/</a:t>
-            </a:r>
-            <a:endParaRPr lang="en-US" sz="1200" dirty="0"/>
-          </a:p>
-        </p:txBody>
-      </p:sp>
-      <p:sp>
-        <p:nvSpPr>
           <p:cNvPr id="27" name="Action Button: Document 26">
             <a:hlinkClick r:id="" action="ppaction://noaction" highlightClick="1"/>
             <a:extLst>
@@ -7912,7 +9939,7 @@
         </p:nvSpPr>
         <p:spPr>
           <a:xfrm>
-            <a:off x="4832141" y="4682667"/>
+            <a:off x="4974172" y="5366408"/>
             <a:ext cx="987973" cy="1090449"/>
           </a:xfrm>
           <a:prstGeom prst="actionButtonDocument">
@@ -7969,7 +9996,7 @@
         </p:nvSpPr>
         <p:spPr>
           <a:xfrm>
-            <a:off x="4314429" y="5865044"/>
+            <a:off x="4372660" y="6456857"/>
             <a:ext cx="2346733" cy="369332"/>
           </a:xfrm>
           <a:prstGeom prst="rect">
@@ -8007,9 +10034,9 @@
           <p:nvPr/>
         </p:nvSpPr>
         <p:spPr>
-          <a:xfrm rot="2999325">
-            <a:off x="6447578" y="2138348"/>
-            <a:ext cx="1415761" cy="420414"/>
+          <a:xfrm rot="1787410">
+            <a:off x="6182925" y="4612841"/>
+            <a:ext cx="2297002" cy="420414"/>
           </a:xfrm>
           <a:prstGeom prst="rightArrow">
             <a:avLst/>
@@ -8066,9 +10093,9 @@
           <p:nvPr/>
         </p:nvSpPr>
         <p:spPr>
-          <a:xfrm rot="18179299">
-            <a:off x="9990948" y="1997968"/>
-            <a:ext cx="821461" cy="420414"/>
+          <a:xfrm rot="17315980">
+            <a:off x="10365278" y="4801160"/>
+            <a:ext cx="617066" cy="420414"/>
           </a:xfrm>
           <a:prstGeom prst="rightArrow">
             <a:avLst/>
@@ -8126,7 +10153,7 @@
         </p:nvSpPr>
         <p:spPr>
           <a:xfrm>
-            <a:off x="2059380" y="2516295"/>
+            <a:off x="1517472" y="5402432"/>
             <a:ext cx="556529" cy="603318"/>
           </a:xfrm>
           <a:prstGeom prst="flowChartMagneticDisk">
@@ -8178,8 +10205,8 @@
           <p:nvPr/>
         </p:nvSpPr>
         <p:spPr>
-          <a:xfrm rot="18034670">
-            <a:off x="2561595" y="2004873"/>
+          <a:xfrm rot="18232847">
+            <a:off x="2001745" y="4918865"/>
             <a:ext cx="644694" cy="420414"/>
           </a:xfrm>
           <a:prstGeom prst="rightArrow">
@@ -8233,7 +10260,7 @@
         </p:nvSpPr>
         <p:spPr>
           <a:xfrm>
-            <a:off x="1401307" y="3132373"/>
+            <a:off x="802372" y="6071629"/>
             <a:ext cx="1863445" cy="369332"/>
           </a:xfrm>
           <a:prstGeom prst="rect">
@@ -8268,7 +10295,7 @@
         </p:nvSpPr>
         <p:spPr>
           <a:xfrm>
-            <a:off x="2680833" y="4660566"/>
+            <a:off x="2906453" y="6198699"/>
             <a:ext cx="1589194" cy="369332"/>
           </a:xfrm>
           <a:prstGeom prst="rect">
@@ -8303,7 +10330,7 @@
         </p:nvSpPr>
         <p:spPr>
           <a:xfrm>
-            <a:off x="3145043" y="3983739"/>
+            <a:off x="3380427" y="5547189"/>
             <a:ext cx="556529" cy="603318"/>
           </a:xfrm>
           <a:prstGeom prst="flowChartMagneticDisk">
@@ -8355,8 +10382,8 @@
           <p:nvPr/>
         </p:nvSpPr>
         <p:spPr>
-          <a:xfrm rot="1656364">
-            <a:off x="3839992" y="4413912"/>
+          <a:xfrm rot="477122">
+            <a:off x="4062686" y="5763883"/>
             <a:ext cx="893613" cy="420414"/>
           </a:xfrm>
           <a:prstGeom prst="rightArrow">
@@ -8415,7 +10442,7 @@
         </p:nvSpPr>
         <p:spPr>
           <a:xfrm>
-            <a:off x="7496821" y="2940420"/>
+            <a:off x="8461290" y="5009599"/>
             <a:ext cx="556529" cy="603318"/>
           </a:xfrm>
           <a:prstGeom prst="flowChartMagneticDisk">
@@ -8468,7 +10495,7 @@
         </p:nvSpPr>
         <p:spPr>
           <a:xfrm>
-            <a:off x="6834953" y="3492913"/>
+            <a:off x="7842943" y="5612917"/>
             <a:ext cx="1989142" cy="369332"/>
           </a:xfrm>
           <a:prstGeom prst="rect">
@@ -8503,8 +10530,8 @@
         </p:nvSpPr>
         <p:spPr>
           <a:xfrm rot="2894254">
-            <a:off x="8582234" y="2058212"/>
-            <a:ext cx="812295" cy="420414"/>
+            <a:off x="8875141" y="4558844"/>
+            <a:ext cx="1369855" cy="420414"/>
           </a:xfrm>
           <a:prstGeom prst="rightArrow">
             <a:avLst/>
@@ -8562,7 +10589,7 @@
         </p:nvSpPr>
         <p:spPr>
           <a:xfrm>
-            <a:off x="9423266" y="2412315"/>
+            <a:off x="10074328" y="5418199"/>
             <a:ext cx="556529" cy="603318"/>
           </a:xfrm>
           <a:prstGeom prst="flowChartMagneticDisk">
@@ -8615,7 +10642,7 @@
         </p:nvSpPr>
         <p:spPr>
           <a:xfrm>
-            <a:off x="8988381" y="3057413"/>
+            <a:off x="9621118" y="5948675"/>
             <a:ext cx="1531886" cy="369332"/>
           </a:xfrm>
           <a:prstGeom prst="rect">
@@ -8649,8 +10676,8 @@
           <p:nvPr/>
         </p:nvSpPr>
         <p:spPr>
-          <a:xfrm rot="16945038">
-            <a:off x="4888317" y="3912044"/>
+          <a:xfrm rot="19763741">
+            <a:off x="5998934" y="5582673"/>
             <a:ext cx="883475" cy="420414"/>
           </a:xfrm>
           <a:prstGeom prst="rightArrow">
@@ -8709,8 +10736,8 @@
         </p:nvSpPr>
         <p:spPr>
           <a:xfrm rot="16945038">
-            <a:off x="5311152" y="2065955"/>
-            <a:ext cx="733649" cy="420414"/>
+            <a:off x="5263911" y="4787133"/>
+            <a:ext cx="663249" cy="420414"/>
           </a:xfrm>
           <a:prstGeom prst="rightArrow">
             <a:avLst/>
@@ -8768,7 +10795,7 @@
         </p:nvSpPr>
         <p:spPr>
           <a:xfrm>
-            <a:off x="5263585" y="2724225"/>
+            <a:off x="6877193" y="5253939"/>
             <a:ext cx="556529" cy="603318"/>
           </a:xfrm>
           <a:prstGeom prst="flowChartMagneticDisk">
@@ -8821,7 +10848,7 @@
         </p:nvSpPr>
         <p:spPr>
           <a:xfrm>
-            <a:off x="4618608" y="3323287"/>
+            <a:off x="6456764" y="5926903"/>
             <a:ext cx="2224904" cy="369332"/>
           </a:xfrm>
           <a:prstGeom prst="rect">
@@ -8842,10 +10869,128 @@
           </a:p>
         </p:txBody>
       </p:sp>
+      <p:sp>
+        <p:nvSpPr>
+          <p:cNvPr id="2" name="Right Arrow 1">
+            <a:extLst>
+              <a:ext uri="{FF2B5EF4-FFF2-40B4-BE49-F238E27FC236}">
+                <a16:creationId xmlns:a16="http://schemas.microsoft.com/office/drawing/2014/main" id="{068431F6-13F5-EA07-18D3-D398127129EB}"/>
+              </a:ext>
+            </a:extLst>
+          </p:cNvPr>
+          <p:cNvSpPr/>
+          <p:nvPr/>
+        </p:nvSpPr>
+        <p:spPr>
+          <a:xfrm rot="13928203">
+            <a:off x="6191747" y="4793812"/>
+            <a:ext cx="722398" cy="420414"/>
+          </a:xfrm>
+          <a:prstGeom prst="rightArrow">
+            <a:avLst/>
+          </a:prstGeom>
+          <a:solidFill>
+            <a:schemeClr val="accent3"/>
+          </a:solidFill>
+          <a:ln>
+            <a:noFill/>
+          </a:ln>
+        </p:spPr>
+        <p:style>
+          <a:lnRef idx="2">
+            <a:schemeClr val="accent1">
+              <a:shade val="50000"/>
+            </a:schemeClr>
+          </a:lnRef>
+          <a:fillRef idx="1">
+            <a:schemeClr val="accent1"/>
+          </a:fillRef>
+          <a:effectRef idx="0">
+            <a:schemeClr val="accent1"/>
+          </a:effectRef>
+          <a:fontRef idx="minor">
+            <a:schemeClr val="lt1"/>
+          </a:fontRef>
+        </p:style>
+        <p:txBody>
+          <a:bodyPr rtlCol="0" anchor="ctr"/>
+          <a:lstStyle/>
+          <a:p>
+            <a:pPr algn="ctr"/>
+            <a:endParaRPr lang="en-US">
+              <a:solidFill>
+                <a:srgbClr val="FF0000"/>
+              </a:solidFill>
+              <a:highlight>
+                <a:srgbClr val="FA8538"/>
+              </a:highlight>
+            </a:endParaRPr>
+          </a:p>
+        </p:txBody>
+      </p:sp>
+      <p:sp>
+        <p:nvSpPr>
+          <p:cNvPr id="69" name="TextBox 68">
+            <a:extLst>
+              <a:ext uri="{FF2B5EF4-FFF2-40B4-BE49-F238E27FC236}">
+                <a16:creationId xmlns:a16="http://schemas.microsoft.com/office/drawing/2014/main" id="{468B9DA0-0C42-A26E-DA3A-8D79CD50F72B}"/>
+              </a:ext>
+            </a:extLst>
+          </p:cNvPr>
+          <p:cNvSpPr txBox="1"/>
+          <p:nvPr/>
+        </p:nvSpPr>
+        <p:spPr>
+          <a:xfrm>
+            <a:off x="9244975" y="6395725"/>
+            <a:ext cx="2947025" cy="461665"/>
+          </a:xfrm>
+          <a:prstGeom prst="rect">
+            <a:avLst/>
+          </a:prstGeom>
+          <a:noFill/>
+        </p:spPr>
+        <p:txBody>
+          <a:bodyPr wrap="none" rtlCol="0">
+            <a:spAutoFit/>
+          </a:bodyPr>
+          <a:lstStyle/>
+          <a:p>
+            <a:r>
+              <a:rPr lang="en-US" sz="1200" dirty="0">
+                <a:hlinkClick r:id="rId2"/>
+              </a:rPr>
+              <a:t>https://openclipart.org/</a:t>
+            </a:r>
+            <a:endParaRPr lang="en-US" sz="1200" dirty="0"/>
+          </a:p>
+          <a:p>
+            <a:r>
+              <a:rPr lang="en-US" sz="1200" dirty="0">
+                <a:hlinkClick r:id="rId3"/>
+              </a:rPr>
+              <a:t>https://</a:t>
+            </a:r>
+            <a:r>
+              <a:rPr lang="en-US" sz="1200" dirty="0" err="1">
+                <a:hlinkClick r:id="rId3"/>
+              </a:rPr>
+              <a:t>unsplash.com</a:t>
+            </a:r>
+            <a:r>
+              <a:rPr lang="en-US" sz="1200" dirty="0">
+                <a:hlinkClick r:id="rId3"/>
+              </a:rPr>
+              <a:t>/photos/_sh9vkVbVgo </a:t>
+            </a:r>
+            <a:endParaRPr lang="en-US" sz="1200" dirty="0"/>
+          </a:p>
+        </p:txBody>
+      </p:sp>
     </p:spTree>
     <p:extLst>
       <p:ext uri="{BB962C8B-B14F-4D97-AF65-F5344CB8AC3E}">
-        <p14:creationId xmlns:p14="http://schemas.microsoft.com/office/powerpoint/2010/main" val="2282613121"/>
+        <p14:creationId xmlns:p14="http://schemas.microsoft.com/office/powerpoint/2010/main" val="1028848563"/>
       </p:ext>
     </p:extLst>
   </p:cSld>

</xml_diff>